<commit_message>
Added content to SITUATION slides
</commit_message>
<xml_diff>
--- a/UNDER DEVELOPMENT/132nd OP ACTIVE RESOLVE Introduction Brief.pptx
+++ b/UNDER DEVELOPMENT/132nd OP ACTIVE RESOLVE Introduction Brief.pptx
@@ -5,21 +5,28 @@
     <p:sldMasterId id="2147483648" r:id="rId1"/>
   </p:sldMasterIdLst>
   <p:notesMasterIdLst>
-    <p:notesMasterId r:id="rId14"/>
+    <p:notesMasterId r:id="rId21"/>
   </p:notesMasterIdLst>
   <p:sldIdLst>
     <p:sldId id="257" r:id="rId2"/>
     <p:sldId id="258" r:id="rId3"/>
     <p:sldId id="265" r:id="rId4"/>
-    <p:sldId id="259" r:id="rId5"/>
-    <p:sldId id="260" r:id="rId6"/>
-    <p:sldId id="261" r:id="rId7"/>
-    <p:sldId id="262" r:id="rId8"/>
-    <p:sldId id="263" r:id="rId9"/>
-    <p:sldId id="264" r:id="rId10"/>
-    <p:sldId id="266" r:id="rId11"/>
-    <p:sldId id="267" r:id="rId12"/>
-    <p:sldId id="268" r:id="rId13"/>
+    <p:sldId id="271" r:id="rId5"/>
+    <p:sldId id="272" r:id="rId6"/>
+    <p:sldId id="273" r:id="rId7"/>
+    <p:sldId id="269" r:id="rId8"/>
+    <p:sldId id="270" r:id="rId9"/>
+    <p:sldId id="274" r:id="rId10"/>
+    <p:sldId id="275" r:id="rId11"/>
+    <p:sldId id="259" r:id="rId12"/>
+    <p:sldId id="260" r:id="rId13"/>
+    <p:sldId id="261" r:id="rId14"/>
+    <p:sldId id="262" r:id="rId15"/>
+    <p:sldId id="263" r:id="rId16"/>
+    <p:sldId id="264" r:id="rId17"/>
+    <p:sldId id="266" r:id="rId18"/>
+    <p:sldId id="267" r:id="rId19"/>
+    <p:sldId id="268" r:id="rId20"/>
   </p:sldIdLst>
   <p:sldSz cx="9144000" cy="5143500" type="screen16x9"/>
   <p:notesSz cx="6858000" cy="9144000"/>
@@ -204,7 +211,7 @@
             <a:fld id="{81BD1341-87FB-4796-99EF-E372FDD897A7}" type="datetimeFigureOut">
               <a:rPr lang="en-US" smtClean="0"/>
               <a:pPr/>
-              <a:t>7/30/2020</a:t>
+              <a:t>7/31/2020</a:t>
             </a:fld>
             <a:endParaRPr lang="en-US"/>
           </a:p>
@@ -373,6 +380,11 @@
         </p:txBody>
       </p:sp>
     </p:spTree>
+    <p:extLst>
+      <p:ext uri="{BB962C8B-B14F-4D97-AF65-F5344CB8AC3E}">
+        <p14:creationId xmlns:p14="http://schemas.microsoft.com/office/powerpoint/2010/main" val="4279864154"/>
+      </p:ext>
+    </p:extLst>
   </p:cSld>
   <p:clrMap bg1="lt1" tx1="dk1" bg2="lt2" tx2="dk2" accent1="accent1" accent2="accent2" accent3="accent3" accent4="accent4" accent5="accent5" accent6="accent6" hlink="hlink" folHlink="folHlink"/>
   <p:notesStyle>
@@ -660,7 +672,7 @@
             <a:fld id="{BB56636F-9E64-48A9-A0E8-D6911EA208CE}" type="datetimeFigureOut">
               <a:rPr lang="nb-NO" smtClean="0"/>
               <a:pPr/>
-              <a:t>30.07.2020</a:t>
+              <a:t>31.07.2020</a:t>
             </a:fld>
             <a:endParaRPr lang="nb-NO"/>
           </a:p>
@@ -851,7 +863,7 @@
             <a:fld id="{BB56636F-9E64-48A9-A0E8-D6911EA208CE}" type="datetimeFigureOut">
               <a:rPr lang="nb-NO" smtClean="0"/>
               <a:pPr/>
-              <a:t>30.07.2020</a:t>
+              <a:t>31.07.2020</a:t>
             </a:fld>
             <a:endParaRPr lang="nb-NO"/>
           </a:p>
@@ -1052,7 +1064,7 @@
             <a:fld id="{BB56636F-9E64-48A9-A0E8-D6911EA208CE}" type="datetimeFigureOut">
               <a:rPr lang="nb-NO" smtClean="0"/>
               <a:pPr/>
-              <a:t>30.07.2020</a:t>
+              <a:t>31.07.2020</a:t>
             </a:fld>
             <a:endParaRPr lang="nb-NO"/>
           </a:p>
@@ -1429,7 +1441,7 @@
             <a:fld id="{BB56636F-9E64-48A9-A0E8-D6911EA208CE}" type="datetimeFigureOut">
               <a:rPr lang="nb-NO" smtClean="0"/>
               <a:pPr/>
-              <a:t>30.07.2020</a:t>
+              <a:t>31.07.2020</a:t>
             </a:fld>
             <a:endParaRPr lang="nb-NO"/>
           </a:p>
@@ -1738,7 +1750,7 @@
             <a:fld id="{BB56636F-9E64-48A9-A0E8-D6911EA208CE}" type="datetimeFigureOut">
               <a:rPr lang="nb-NO" smtClean="0"/>
               <a:pPr/>
-              <a:t>30.07.2020</a:t>
+              <a:t>31.07.2020</a:t>
             </a:fld>
             <a:endParaRPr lang="nb-NO"/>
           </a:p>
@@ -2181,7 +2193,7 @@
             <a:fld id="{BB56636F-9E64-48A9-A0E8-D6911EA208CE}" type="datetimeFigureOut">
               <a:rPr lang="nb-NO" smtClean="0"/>
               <a:pPr/>
-              <a:t>30.07.2020</a:t>
+              <a:t>31.07.2020</a:t>
             </a:fld>
             <a:endParaRPr lang="nb-NO"/>
           </a:p>
@@ -2334,7 +2346,7 @@
             <a:fld id="{BB56636F-9E64-48A9-A0E8-D6911EA208CE}" type="datetimeFigureOut">
               <a:rPr lang="nb-NO" smtClean="0"/>
               <a:pPr/>
-              <a:t>30.07.2020</a:t>
+              <a:t>31.07.2020</a:t>
             </a:fld>
             <a:endParaRPr lang="nb-NO"/>
           </a:p>
@@ -2450,7 +2462,7 @@
             <a:fld id="{BB56636F-9E64-48A9-A0E8-D6911EA208CE}" type="datetimeFigureOut">
               <a:rPr lang="nb-NO" smtClean="0"/>
               <a:pPr/>
-              <a:t>30.07.2020</a:t>
+              <a:t>31.07.2020</a:t>
             </a:fld>
             <a:endParaRPr lang="nb-NO"/>
           </a:p>
@@ -2748,7 +2760,7 @@
             <a:fld id="{BB56636F-9E64-48A9-A0E8-D6911EA208CE}" type="datetimeFigureOut">
               <a:rPr lang="nb-NO" smtClean="0"/>
               <a:pPr/>
-              <a:t>30.07.2020</a:t>
+              <a:t>31.07.2020</a:t>
             </a:fld>
             <a:endParaRPr lang="nb-NO"/>
           </a:p>
@@ -3022,7 +3034,7 @@
             <a:fld id="{BB56636F-9E64-48A9-A0E8-D6911EA208CE}" type="datetimeFigureOut">
               <a:rPr lang="nb-NO" smtClean="0"/>
               <a:pPr/>
-              <a:t>30.07.2020</a:t>
+              <a:t>31.07.2020</a:t>
             </a:fld>
             <a:endParaRPr lang="nb-NO"/>
           </a:p>
@@ -3659,106 +3671,108 @@
             <p:ph idx="1"/>
           </p:nvPr>
         </p:nvSpPr>
-        <p:spPr>
-          <a:xfrm>
-            <a:off x="0" y="843558"/>
-            <a:ext cx="9144000" cy="4176463"/>
-          </a:xfrm>
-        </p:spPr>
+        <p:spPr/>
         <p:txBody>
           <a:bodyPr>
-            <a:normAutofit lnSpcReduction="10000"/>
+            <a:normAutofit fontScale="92500" lnSpcReduction="20000"/>
           </a:bodyPr>
           <a:lstStyle/>
           <a:p>
-            <a:r>
-              <a:rPr lang="en-US" dirty="0" smtClean="0"/>
-              <a:t>CJTF-82 Operation order (OPORDER)</a:t>
-            </a:r>
-          </a:p>
-          <a:p>
-            <a:r>
-              <a:rPr lang="en-US" dirty="0" smtClean="0"/>
-              <a:t>JFACC Joint Air Operations Plan</a:t>
-            </a:r>
-          </a:p>
-          <a:p>
-            <a:r>
-              <a:rPr lang="en-US" dirty="0" smtClean="0"/>
-              <a:t>Air Operations Directive (AOD)</a:t>
-            </a:r>
-          </a:p>
-          <a:p>
-            <a:r>
-              <a:rPr lang="en-US" dirty="0" smtClean="0"/>
-              <a:t>Joint Target List</a:t>
-            </a:r>
-          </a:p>
-          <a:p>
-            <a:r>
-              <a:rPr lang="en-US" dirty="0" smtClean="0"/>
-              <a:t>Joint Prioritized Target List</a:t>
-            </a:r>
-          </a:p>
-          <a:p>
-            <a:r>
-              <a:rPr lang="en-US" dirty="0" smtClean="0"/>
-              <a:t>TST Matrix</a:t>
-            </a:r>
-          </a:p>
-          <a:p>
-            <a:r>
-              <a:rPr lang="en-US" dirty="0" smtClean="0"/>
-              <a:t>Intelligence Report (INTREP)</a:t>
-            </a:r>
-          </a:p>
-          <a:p>
-            <a:pPr lvl="1"/>
-            <a:r>
-              <a:rPr lang="en-US" dirty="0" smtClean="0"/>
-              <a:t>Basic </a:t>
-            </a:r>
-            <a:r>
-              <a:rPr lang="en-US" dirty="0" err="1" smtClean="0"/>
-              <a:t>Intrep</a:t>
-            </a:r>
-            <a:r>
-              <a:rPr lang="en-US" dirty="0" smtClean="0"/>
-              <a:t> (Common to all 132</a:t>
-            </a:r>
-            <a:r>
-              <a:rPr lang="en-US" baseline="30000" dirty="0" smtClean="0"/>
-              <a:t>nd</a:t>
-            </a:r>
-            <a:r>
-              <a:rPr lang="en-US" dirty="0" smtClean="0"/>
-              <a:t> events)</a:t>
-            </a:r>
-          </a:p>
-          <a:p>
-            <a:pPr lvl="1"/>
-            <a:r>
-              <a:rPr lang="en-US" dirty="0" smtClean="0"/>
-              <a:t>OPAR specific reports (Specific to OPAR only)</a:t>
-            </a:r>
-          </a:p>
-          <a:p>
-            <a:r>
-              <a:rPr lang="en-US" dirty="0" smtClean="0"/>
-              <a:t>Intelligence Summary (INTSUM)</a:t>
-            </a:r>
-          </a:p>
-          <a:p>
-            <a:r>
-              <a:rPr lang="en-US" dirty="0" smtClean="0"/>
-              <a:t>Target Folder (TF)</a:t>
-            </a:r>
-          </a:p>
-          <a:p>
-            <a:r>
-              <a:rPr lang="en-US" dirty="0" smtClean="0"/>
-              <a:t>SPINS (Special Instructions)</a:t>
-            </a:r>
+            <a:pPr marL="0" indent="0">
+              <a:buNone/>
+            </a:pPr>
+            <a:r>
+              <a:rPr lang="en-US" b="1" dirty="0" smtClean="0"/>
+              <a:t>Iran</a:t>
+            </a:r>
+          </a:p>
+          <a:p>
+            <a:pPr marL="0" indent="0">
+              <a:buNone/>
+            </a:pPr>
+            <a:r>
+              <a:rPr lang="en-US" dirty="0" smtClean="0"/>
+              <a:t>Iran also </a:t>
+            </a:r>
+            <a:r>
+              <a:rPr lang="en-US" dirty="0"/>
+              <a:t>seeks to increase its influence in the region. Iran aspires to achieve a status of dominant </a:t>
+            </a:r>
+            <a:r>
+              <a:rPr lang="en-US" dirty="0" smtClean="0"/>
+              <a:t>power. Iran invests effort in building capabilities against Israel in the following areas:</a:t>
+            </a:r>
+          </a:p>
+          <a:p>
+            <a:pPr marL="457200" indent="-457200">
+              <a:buAutoNum type="arabicParenR"/>
+            </a:pPr>
+            <a:r>
+              <a:rPr lang="en-US" dirty="0" smtClean="0"/>
+              <a:t>Build deterrence </a:t>
+            </a:r>
+            <a:r>
+              <a:rPr lang="en-US" dirty="0"/>
+              <a:t>against Israel by staging forces close to Israeli border. Such force can include ballistic missiles as well as militants which would can be used to retaliate against </a:t>
+            </a:r>
+            <a:r>
+              <a:rPr lang="en-US" dirty="0" smtClean="0"/>
+              <a:t>Israel</a:t>
+            </a:r>
+          </a:p>
+          <a:p>
+            <a:pPr marL="457200" indent="-457200">
+              <a:buAutoNum type="arabicParenR"/>
+            </a:pPr>
+            <a:r>
+              <a:rPr lang="en-US" dirty="0" smtClean="0"/>
+              <a:t>Supporting Hezbollah </a:t>
+            </a:r>
+            <a:r>
+              <a:rPr lang="en-US" dirty="0"/>
+              <a:t>in military equipment, training camps and funding to be used as an additional </a:t>
+            </a:r>
+            <a:r>
+              <a:rPr lang="en-US" dirty="0" smtClean="0"/>
+              <a:t>deterrence </a:t>
+            </a:r>
+            <a:r>
+              <a:rPr lang="en-US" dirty="0"/>
+              <a:t>tool against </a:t>
+            </a:r>
+            <a:r>
+              <a:rPr lang="en-US" dirty="0" smtClean="0"/>
+              <a:t>Israel</a:t>
+            </a:r>
+          </a:p>
+          <a:p>
+            <a:pPr marL="457200" indent="-457200">
+              <a:buAutoNum type="arabicParenR"/>
+            </a:pPr>
+            <a:endParaRPr lang="en-US" dirty="0"/>
+          </a:p>
+          <a:p>
+            <a:pPr marL="0" indent="0">
+              <a:buNone/>
+            </a:pPr>
+            <a:r>
+              <a:rPr lang="en-US" b="1" dirty="0" smtClean="0"/>
+              <a:t>Hezbollah</a:t>
+            </a:r>
+          </a:p>
+          <a:p>
+            <a:pPr marL="0" indent="0">
+              <a:buNone/>
+            </a:pPr>
+            <a:r>
+              <a:rPr lang="en-US" dirty="0" smtClean="0"/>
+              <a:t>Hezbollah is </a:t>
+            </a:r>
+            <a:r>
+              <a:rPr lang="en-US" dirty="0"/>
+              <a:t>maintaining presence in Southern Lebanon and in the Syrian side of the Golan-Heights to inflict pressure on Israel and deter against possible Israeli incursions into Lebanon (Although not initiating escalation of the situation without specific instructions of support from Iran)</a:t>
+            </a:r>
+            <a:endParaRPr lang="en-US" dirty="0"/>
           </a:p>
         </p:txBody>
       </p:sp>
@@ -3772,20 +3786,30 @@
             <p:ph type="title"/>
           </p:nvPr>
         </p:nvSpPr>
-        <p:spPr/>
-        <p:txBody>
-          <a:bodyPr/>
-          <a:lstStyle/>
-          <a:p>
-            <a:r>
-              <a:rPr lang="en-US" dirty="0" smtClean="0"/>
-              <a:t>PRODUCTS</a:t>
+        <p:spPr>
+          <a:xfrm>
+            <a:off x="755576" y="0"/>
+            <a:ext cx="8373616" cy="648073"/>
+          </a:xfrm>
+        </p:spPr>
+        <p:txBody>
+          <a:bodyPr/>
+          <a:lstStyle/>
+          <a:p>
+            <a:r>
+              <a:rPr lang="en-US" dirty="0" smtClean="0"/>
+              <a:t>SITUATION – Iran &amp; Hezbollah</a:t>
             </a:r>
             <a:endParaRPr lang="en-US" dirty="0"/>
           </a:p>
         </p:txBody>
       </p:sp>
     </p:spTree>
+    <p:extLst>
+      <p:ext uri="{BB962C8B-B14F-4D97-AF65-F5344CB8AC3E}">
+        <p14:creationId xmlns:p14="http://schemas.microsoft.com/office/powerpoint/2010/main" val="2518501864"/>
+      </p:ext>
+    </p:extLst>
   </p:cSld>
   <p:clrMapOvr>
     <a:masterClrMapping/>
@@ -3822,120 +3846,66 @@
         </p:nvSpPr>
         <p:spPr>
           <a:xfrm>
-            <a:off x="0" y="843558"/>
-            <a:ext cx="9144000" cy="4176463"/>
-          </a:xfrm>
-        </p:spPr>
-        <p:txBody>
-          <a:bodyPr/>
-          <a:lstStyle/>
-          <a:p>
-            <a:pPr lvl="0">
+            <a:off x="0" y="771550"/>
+            <a:ext cx="9036496" cy="2448272"/>
+          </a:xfrm>
+        </p:spPr>
+        <p:txBody>
+          <a:bodyPr>
+            <a:normAutofit/>
+          </a:bodyPr>
+          <a:lstStyle/>
+          <a:p>
+            <a:r>
+              <a:rPr lang="en-US" dirty="0" smtClean="0"/>
+              <a:t>Combined Joint Task Force Headquarter (CJTF HQ): Mission makes/event hosts</a:t>
+            </a:r>
+          </a:p>
+          <a:p>
+            <a:r>
+              <a:rPr lang="en-US" b="1" dirty="0" smtClean="0"/>
+              <a:t>Joint Force Air Component Commander (JFACC): Volunteer 132</a:t>
+            </a:r>
+            <a:r>
+              <a:rPr lang="en-US" b="1" baseline="30000" dirty="0" smtClean="0"/>
+              <a:t>nd</a:t>
+            </a:r>
+            <a:r>
+              <a:rPr lang="en-US" b="1" dirty="0" smtClean="0"/>
+              <a:t> members</a:t>
+            </a:r>
+          </a:p>
+          <a:p>
+            <a:r>
+              <a:rPr lang="en-US" dirty="0" smtClean="0"/>
+              <a:t>Air Operations Centre (AOC): Mission makes/event hosts</a:t>
+            </a:r>
+          </a:p>
+          <a:p>
+            <a:r>
+              <a:rPr lang="en-US" dirty="0" smtClean="0"/>
+              <a:t>Virtual Intelligence Directorate (VID): Mission makes/event hosts</a:t>
+            </a:r>
+          </a:p>
+          <a:p>
+            <a:r>
+              <a:rPr lang="en-US" b="1" dirty="0" smtClean="0"/>
+              <a:t>Virtual Intelligence Service (VIS): Volunteer 132</a:t>
+            </a:r>
+            <a:r>
+              <a:rPr lang="en-US" b="1" baseline="30000" dirty="0" smtClean="0"/>
+              <a:t>nd</a:t>
+            </a:r>
+            <a:r>
+              <a:rPr lang="en-US" b="1" dirty="0" smtClean="0"/>
+              <a:t> members</a:t>
+            </a:r>
+          </a:p>
+          <a:p>
+            <a:pPr>
               <a:buNone/>
             </a:pPr>
-            <a:r>
-              <a:rPr lang="en-US" dirty="0" smtClean="0"/>
-              <a:t>- Minimum 14 days between each event (real world days)</a:t>
-            </a:r>
-          </a:p>
-          <a:p>
-            <a:pPr lvl="0">
-              <a:buNone/>
-            </a:pPr>
-            <a:r>
-              <a:rPr lang="en-US" dirty="0" smtClean="0"/>
-              <a:t>- Each event takes place on a day in the campaign</a:t>
-            </a:r>
-          </a:p>
-          <a:p>
-            <a:pPr lvl="0">
-              <a:buNone/>
-            </a:pPr>
-            <a:endParaRPr lang="en-US" dirty="0" smtClean="0"/>
-          </a:p>
-          <a:p>
-            <a:pPr lvl="0"/>
-            <a:r>
-              <a:rPr lang="en-US" sz="1600" dirty="0" smtClean="0"/>
-              <a:t>Day </a:t>
-            </a:r>
-            <a:r>
-              <a:rPr lang="en-US" sz="1600" dirty="0" smtClean="0"/>
-              <a:t>1: </a:t>
-            </a:r>
-            <a:r>
-              <a:rPr lang="en-US" sz="1600" dirty="0" smtClean="0"/>
-              <a:t>Event, campaign day 1 </a:t>
-            </a:r>
-            <a:r>
-              <a:rPr lang="en-US" sz="1600" dirty="0" smtClean="0"/>
-              <a:t>(Sunday)</a:t>
-            </a:r>
-            <a:endParaRPr lang="nb-NO" sz="1600" dirty="0" smtClean="0"/>
-          </a:p>
-          <a:p>
-            <a:pPr lvl="0"/>
-            <a:r>
-              <a:rPr lang="en-US" sz="1600" dirty="0" smtClean="0"/>
-              <a:t>Day 2: AARs and BDAs to be provided by pilots (Monday)</a:t>
-            </a:r>
-            <a:endParaRPr lang="nb-NO" sz="1600" dirty="0" smtClean="0"/>
-          </a:p>
-          <a:p>
-            <a:pPr lvl="0"/>
-            <a:r>
-              <a:rPr lang="en-US" sz="1600" dirty="0" smtClean="0"/>
-              <a:t>Day 3-8: VIS production and publish new INTSUM NLT Day 8 (Monday)</a:t>
-            </a:r>
-            <a:endParaRPr lang="nb-NO" sz="1600" dirty="0" smtClean="0"/>
-          </a:p>
-          <a:p>
-            <a:pPr lvl="0"/>
-            <a:r>
-              <a:rPr lang="en-US" sz="1600" dirty="0" smtClean="0"/>
-              <a:t>Day 8-12: JFACC guidance to AOC (publish new AOD, NLT Day 12, Friday) (supported by VIS throughout)</a:t>
-            </a:r>
-            <a:endParaRPr lang="nb-NO" sz="1600" dirty="0" smtClean="0"/>
-          </a:p>
-          <a:p>
-            <a:pPr lvl="0"/>
-            <a:r>
-              <a:rPr lang="en-US" sz="1600" dirty="0" smtClean="0"/>
-              <a:t>Day 12: AOC work day: </a:t>
-            </a:r>
-            <a:r>
-              <a:rPr lang="en-US" sz="1600" dirty="0" err="1" smtClean="0"/>
-              <a:t>Taskings</a:t>
-            </a:r>
-            <a:r>
-              <a:rPr lang="en-US" sz="1600" dirty="0" smtClean="0"/>
-              <a:t>/briefing/assignments (Friday)</a:t>
-            </a:r>
-            <a:endParaRPr lang="nb-NO" sz="1600" dirty="0" smtClean="0"/>
-          </a:p>
-          <a:p>
-            <a:pPr lvl="0"/>
-            <a:r>
-              <a:rPr lang="en-US" sz="1600" dirty="0" smtClean="0"/>
-              <a:t>Day 13+14: Pilots planning days</a:t>
-            </a:r>
-            <a:endParaRPr lang="nb-NO" sz="1600" dirty="0" smtClean="0"/>
-          </a:p>
-          <a:p>
-            <a:pPr lvl="0"/>
-            <a:r>
-              <a:rPr lang="en-US" sz="1600" dirty="0" smtClean="0"/>
-              <a:t>Day 14: </a:t>
-            </a:r>
-            <a:r>
-              <a:rPr lang="en-US" sz="1600" dirty="0" smtClean="0"/>
-              <a:t>Event, campaign day 2 </a:t>
-            </a:r>
-            <a:r>
-              <a:rPr lang="en-US" sz="1600" dirty="0" smtClean="0"/>
-              <a:t>(Sunday)</a:t>
-            </a:r>
-            <a:endParaRPr lang="nb-NO" sz="1600" dirty="0"/>
+            <a:endParaRPr lang="en-US" dirty="0"/>
           </a:p>
         </p:txBody>
       </p:sp>
@@ -3956,7 +3926,7 @@
           <a:p>
             <a:r>
               <a:rPr lang="en-US" dirty="0" smtClean="0"/>
-              <a:t>GENERIC TIMELINE</a:t>
+              <a:t>FUNCTIONS / ROLES </a:t>
             </a:r>
             <a:endParaRPr lang="en-US" dirty="0"/>
           </a:p>
@@ -4000,6 +3970,933 @@
         <p:spPr>
           <a:xfrm>
             <a:off x="0" y="843558"/>
+            <a:ext cx="4572000" cy="4176463"/>
+          </a:xfrm>
+        </p:spPr>
+        <p:txBody>
+          <a:bodyPr/>
+          <a:lstStyle/>
+          <a:p>
+            <a:r>
+              <a:rPr lang="en-US" dirty="0" smtClean="0"/>
+              <a:t>Commander of the entire force (Both Air Sea and Ground)</a:t>
+            </a:r>
+          </a:p>
+          <a:p>
+            <a:r>
+              <a:rPr lang="en-US" dirty="0" smtClean="0"/>
+              <a:t>Mission designers /event host</a:t>
+            </a:r>
+          </a:p>
+          <a:p>
+            <a:r>
+              <a:rPr lang="en-US" dirty="0" smtClean="0"/>
+              <a:t>Ensures to streamline events</a:t>
+            </a:r>
+          </a:p>
+          <a:p>
+            <a:endParaRPr lang="en-US" dirty="0"/>
+          </a:p>
+        </p:txBody>
+      </p:sp>
+      <p:sp>
+        <p:nvSpPr>
+          <p:cNvPr id="3" name="Tittel 2"/>
+          <p:cNvSpPr>
+            <a:spLocks noGrp="1"/>
+          </p:cNvSpPr>
+          <p:nvPr>
+            <p:ph type="title"/>
+          </p:nvPr>
+        </p:nvSpPr>
+        <p:spPr/>
+        <p:txBody>
+          <a:bodyPr/>
+          <a:lstStyle/>
+          <a:p>
+            <a:r>
+              <a:rPr lang="en-US" dirty="0" smtClean="0"/>
+              <a:t>CJTF – 82  HQ</a:t>
+            </a:r>
+            <a:endParaRPr lang="en-US" dirty="0"/>
+          </a:p>
+        </p:txBody>
+      </p:sp>
+      <p:pic>
+        <p:nvPicPr>
+          <p:cNvPr id="2050" name="Picture 2" descr="D:\DCS_Missions\OPAR-Brief\LOGOS\OPAR CJTF_82_Logo.png"/>
+          <p:cNvPicPr>
+            <a:picLocks noChangeAspect="1" noChangeArrowheads="1"/>
+          </p:cNvPicPr>
+          <p:nvPr/>
+        </p:nvPicPr>
+        <p:blipFill>
+          <a:blip r:embed="rId2" cstate="print"/>
+          <a:srcRect/>
+          <a:stretch>
+            <a:fillRect/>
+          </a:stretch>
+        </p:blipFill>
+        <p:spPr bwMode="auto">
+          <a:xfrm>
+            <a:off x="4751512" y="339502"/>
+            <a:ext cx="4392488" cy="4392488"/>
+          </a:xfrm>
+          <a:prstGeom prst="rect">
+            <a:avLst/>
+          </a:prstGeom>
+          <a:noFill/>
+        </p:spPr>
+      </p:pic>
+    </p:spTree>
+  </p:cSld>
+  <p:clrMapOvr>
+    <a:masterClrMapping/>
+  </p:clrMapOvr>
+</p:sld>
+</file>
+
+<file path=ppt/slides/slide13.xml><?xml version="1.0" encoding="utf-8"?>
+<p:sld xmlns:a="http://schemas.openxmlformats.org/drawingml/2006/main" xmlns:r="http://schemas.openxmlformats.org/officeDocument/2006/relationships" xmlns:p="http://schemas.openxmlformats.org/presentationml/2006/main">
+  <p:cSld>
+    <p:spTree>
+      <p:nvGrpSpPr>
+        <p:cNvPr id="1" name=""/>
+        <p:cNvGrpSpPr/>
+        <p:nvPr/>
+      </p:nvGrpSpPr>
+      <p:grpSpPr>
+        <a:xfrm>
+          <a:off x="0" y="0"/>
+          <a:ext cx="0" cy="0"/>
+          <a:chOff x="0" y="0"/>
+          <a:chExt cx="0" cy="0"/>
+        </a:xfrm>
+      </p:grpSpPr>
+      <p:sp>
+        <p:nvSpPr>
+          <p:cNvPr id="2" name="Plassholder for innhold 1"/>
+          <p:cNvSpPr>
+            <a:spLocks noGrp="1"/>
+          </p:cNvSpPr>
+          <p:nvPr>
+            <p:ph idx="1"/>
+          </p:nvPr>
+        </p:nvSpPr>
+        <p:spPr>
+          <a:xfrm>
+            <a:off x="0" y="843558"/>
+            <a:ext cx="4572000" cy="4176463"/>
+          </a:xfrm>
+        </p:spPr>
+        <p:txBody>
+          <a:bodyPr/>
+          <a:lstStyle/>
+          <a:p>
+            <a:r>
+              <a:rPr lang="en-US" dirty="0" smtClean="0"/>
+              <a:t>Commander of Air Forces involved in the operation</a:t>
+            </a:r>
+          </a:p>
+          <a:p>
+            <a:r>
+              <a:rPr lang="en-US" dirty="0" smtClean="0"/>
+              <a:t>Volunteer 132</a:t>
+            </a:r>
+            <a:r>
+              <a:rPr lang="en-US" baseline="30000" dirty="0" smtClean="0"/>
+              <a:t>nd</a:t>
+            </a:r>
+            <a:r>
+              <a:rPr lang="en-US" dirty="0" smtClean="0"/>
+              <a:t> members</a:t>
+            </a:r>
+          </a:p>
+          <a:p>
+            <a:r>
+              <a:rPr lang="en-US" dirty="0" smtClean="0"/>
+              <a:t>Takes guidance from CJTF-82 HQ, available intelligence, with support from VIS to develop and execute the air campaign </a:t>
+            </a:r>
+          </a:p>
+          <a:p>
+            <a:endParaRPr lang="en-US" dirty="0" smtClean="0"/>
+          </a:p>
+          <a:p>
+            <a:endParaRPr lang="en-US" dirty="0" smtClean="0"/>
+          </a:p>
+          <a:p>
+            <a:pPr>
+              <a:buNone/>
+            </a:pPr>
+            <a:r>
+              <a:rPr lang="en-US" dirty="0" smtClean="0"/>
+              <a:t>For details:</a:t>
+            </a:r>
+          </a:p>
+          <a:p>
+            <a:r>
+              <a:rPr lang="en-US" dirty="0" smtClean="0"/>
+              <a:t>See JFACC Instructions (LINK)</a:t>
+            </a:r>
+          </a:p>
+          <a:p>
+            <a:endParaRPr lang="en-US" dirty="0" smtClean="0"/>
+          </a:p>
+          <a:p>
+            <a:endParaRPr lang="en-US" dirty="0"/>
+          </a:p>
+        </p:txBody>
+      </p:sp>
+      <p:sp>
+        <p:nvSpPr>
+          <p:cNvPr id="3" name="Tittel 2"/>
+          <p:cNvSpPr>
+            <a:spLocks noGrp="1"/>
+          </p:cNvSpPr>
+          <p:nvPr>
+            <p:ph type="title"/>
+          </p:nvPr>
+        </p:nvSpPr>
+        <p:spPr/>
+        <p:txBody>
+          <a:bodyPr/>
+          <a:lstStyle/>
+          <a:p>
+            <a:r>
+              <a:rPr lang="en-US" dirty="0" smtClean="0"/>
+              <a:t>JFACC</a:t>
+            </a:r>
+            <a:endParaRPr lang="en-US" dirty="0"/>
+          </a:p>
+        </p:txBody>
+      </p:sp>
+      <p:pic>
+        <p:nvPicPr>
+          <p:cNvPr id="3074" name="Picture 2" descr="D:\DCS_Missions\OPAR-Brief\LOGOS\OPAR JFACC logo.png"/>
+          <p:cNvPicPr>
+            <a:picLocks noChangeAspect="1" noChangeArrowheads="1"/>
+          </p:cNvPicPr>
+          <p:nvPr/>
+        </p:nvPicPr>
+        <p:blipFill>
+          <a:blip r:embed="rId2" cstate="print"/>
+          <a:srcRect/>
+          <a:stretch>
+            <a:fillRect/>
+          </a:stretch>
+        </p:blipFill>
+        <p:spPr bwMode="auto">
+          <a:xfrm>
+            <a:off x="5292080" y="987574"/>
+            <a:ext cx="3483212" cy="3556447"/>
+          </a:xfrm>
+          <a:prstGeom prst="rect">
+            <a:avLst/>
+          </a:prstGeom>
+          <a:noFill/>
+        </p:spPr>
+      </p:pic>
+    </p:spTree>
+  </p:cSld>
+  <p:clrMapOvr>
+    <a:masterClrMapping/>
+  </p:clrMapOvr>
+</p:sld>
+</file>
+
+<file path=ppt/slides/slide14.xml><?xml version="1.0" encoding="utf-8"?>
+<p:sld xmlns:a="http://schemas.openxmlformats.org/drawingml/2006/main" xmlns:r="http://schemas.openxmlformats.org/officeDocument/2006/relationships" xmlns:p="http://schemas.openxmlformats.org/presentationml/2006/main">
+  <p:cSld>
+    <p:spTree>
+      <p:nvGrpSpPr>
+        <p:cNvPr id="1" name=""/>
+        <p:cNvGrpSpPr/>
+        <p:nvPr/>
+      </p:nvGrpSpPr>
+      <p:grpSpPr>
+        <a:xfrm>
+          <a:off x="0" y="0"/>
+          <a:ext cx="0" cy="0"/>
+          <a:chOff x="0" y="0"/>
+          <a:chExt cx="0" cy="0"/>
+        </a:xfrm>
+      </p:grpSpPr>
+      <p:sp>
+        <p:nvSpPr>
+          <p:cNvPr id="2" name="Plassholder for innhold 1"/>
+          <p:cNvSpPr>
+            <a:spLocks noGrp="1"/>
+          </p:cNvSpPr>
+          <p:nvPr>
+            <p:ph idx="1"/>
+          </p:nvPr>
+        </p:nvSpPr>
+        <p:spPr>
+          <a:xfrm>
+            <a:off x="0" y="843558"/>
+            <a:ext cx="4572000" cy="4176463"/>
+          </a:xfrm>
+        </p:spPr>
+        <p:txBody>
+          <a:bodyPr/>
+          <a:lstStyle/>
+          <a:p>
+            <a:r>
+              <a:rPr lang="en-US" dirty="0" smtClean="0"/>
+              <a:t>Translates JFACC daily guidance into a executable Air Tasking Order</a:t>
+            </a:r>
+          </a:p>
+          <a:p>
+            <a:r>
+              <a:rPr lang="en-US" dirty="0" smtClean="0"/>
+              <a:t>Mission designers /event host</a:t>
+            </a:r>
+          </a:p>
+          <a:p>
+            <a:r>
+              <a:rPr lang="en-US" dirty="0" smtClean="0"/>
+              <a:t>Ensures to streamline events</a:t>
+            </a:r>
+            <a:endParaRPr lang="en-US" dirty="0"/>
+          </a:p>
+        </p:txBody>
+      </p:sp>
+      <p:sp>
+        <p:nvSpPr>
+          <p:cNvPr id="3" name="Tittel 2"/>
+          <p:cNvSpPr>
+            <a:spLocks noGrp="1"/>
+          </p:cNvSpPr>
+          <p:nvPr>
+            <p:ph type="title"/>
+          </p:nvPr>
+        </p:nvSpPr>
+        <p:spPr/>
+        <p:txBody>
+          <a:bodyPr/>
+          <a:lstStyle/>
+          <a:p>
+            <a:r>
+              <a:rPr lang="en-US" dirty="0" smtClean="0"/>
+              <a:t>AOC</a:t>
+            </a:r>
+            <a:endParaRPr lang="en-US" dirty="0"/>
+          </a:p>
+        </p:txBody>
+      </p:sp>
+    </p:spTree>
+  </p:cSld>
+  <p:clrMapOvr>
+    <a:masterClrMapping/>
+  </p:clrMapOvr>
+</p:sld>
+</file>
+
+<file path=ppt/slides/slide15.xml><?xml version="1.0" encoding="utf-8"?>
+<p:sld xmlns:a="http://schemas.openxmlformats.org/drawingml/2006/main" xmlns:r="http://schemas.openxmlformats.org/officeDocument/2006/relationships" xmlns:p="http://schemas.openxmlformats.org/presentationml/2006/main">
+  <p:cSld>
+    <p:spTree>
+      <p:nvGrpSpPr>
+        <p:cNvPr id="1" name=""/>
+        <p:cNvGrpSpPr/>
+        <p:nvPr/>
+      </p:nvGrpSpPr>
+      <p:grpSpPr>
+        <a:xfrm>
+          <a:off x="0" y="0"/>
+          <a:ext cx="0" cy="0"/>
+          <a:chOff x="0" y="0"/>
+          <a:chExt cx="0" cy="0"/>
+        </a:xfrm>
+      </p:grpSpPr>
+      <p:sp>
+        <p:nvSpPr>
+          <p:cNvPr id="2" name="Plassholder for innhold 1"/>
+          <p:cNvSpPr>
+            <a:spLocks noGrp="1"/>
+          </p:cNvSpPr>
+          <p:nvPr>
+            <p:ph idx="1"/>
+          </p:nvPr>
+        </p:nvSpPr>
+        <p:spPr>
+          <a:xfrm>
+            <a:off x="0" y="843558"/>
+            <a:ext cx="4572000" cy="4176463"/>
+          </a:xfrm>
+        </p:spPr>
+        <p:txBody>
+          <a:bodyPr/>
+          <a:lstStyle/>
+          <a:p>
+            <a:r>
+              <a:rPr lang="en-US" dirty="0" smtClean="0"/>
+              <a:t>Higher intelligence agency.</a:t>
+            </a:r>
+          </a:p>
+          <a:p>
+            <a:r>
+              <a:rPr lang="en-US" dirty="0" smtClean="0"/>
+              <a:t>Mission designers /event host</a:t>
+            </a:r>
+          </a:p>
+          <a:p>
+            <a:r>
+              <a:rPr lang="en-US" dirty="0" smtClean="0"/>
+              <a:t>A way for mission designers/event hosts to introduce intelligence into the scenario.</a:t>
+            </a:r>
+          </a:p>
+          <a:p>
+            <a:r>
+              <a:rPr lang="en-US" dirty="0" smtClean="0"/>
+              <a:t>Reports will be forwarded to VIS</a:t>
+            </a:r>
+            <a:endParaRPr lang="en-US" dirty="0"/>
+          </a:p>
+        </p:txBody>
+      </p:sp>
+      <p:sp>
+        <p:nvSpPr>
+          <p:cNvPr id="3" name="Tittel 2"/>
+          <p:cNvSpPr>
+            <a:spLocks noGrp="1"/>
+          </p:cNvSpPr>
+          <p:nvPr>
+            <p:ph type="title"/>
+          </p:nvPr>
+        </p:nvSpPr>
+        <p:spPr/>
+        <p:txBody>
+          <a:bodyPr/>
+          <a:lstStyle/>
+          <a:p>
+            <a:r>
+              <a:rPr lang="en-US" dirty="0" smtClean="0"/>
+              <a:t>VID</a:t>
+            </a:r>
+            <a:endParaRPr lang="en-US" dirty="0"/>
+          </a:p>
+        </p:txBody>
+      </p:sp>
+      <p:pic>
+        <p:nvPicPr>
+          <p:cNvPr id="5122" name="Picture 2" descr="https://media.discordapp.net/attachments/361618361815138313/738329332224753674/unknown.png?width=665&amp;height=677"/>
+          <p:cNvPicPr>
+            <a:picLocks noChangeAspect="1" noChangeArrowheads="1"/>
+          </p:cNvPicPr>
+          <p:nvPr/>
+        </p:nvPicPr>
+        <p:blipFill>
+          <a:blip r:embed="rId2" cstate="print"/>
+          <a:srcRect/>
+          <a:stretch>
+            <a:fillRect/>
+          </a:stretch>
+        </p:blipFill>
+        <p:spPr bwMode="auto">
+          <a:xfrm>
+            <a:off x="5364088" y="1131590"/>
+            <a:ext cx="3112192" cy="3168352"/>
+          </a:xfrm>
+          <a:prstGeom prst="rect">
+            <a:avLst/>
+          </a:prstGeom>
+          <a:noFill/>
+        </p:spPr>
+      </p:pic>
+    </p:spTree>
+  </p:cSld>
+  <p:clrMapOvr>
+    <a:masterClrMapping/>
+  </p:clrMapOvr>
+</p:sld>
+</file>
+
+<file path=ppt/slides/slide16.xml><?xml version="1.0" encoding="utf-8"?>
+<p:sld xmlns:a="http://schemas.openxmlformats.org/drawingml/2006/main" xmlns:r="http://schemas.openxmlformats.org/officeDocument/2006/relationships" xmlns:p="http://schemas.openxmlformats.org/presentationml/2006/main">
+  <p:cSld>
+    <p:spTree>
+      <p:nvGrpSpPr>
+        <p:cNvPr id="1" name=""/>
+        <p:cNvGrpSpPr/>
+        <p:nvPr/>
+      </p:nvGrpSpPr>
+      <p:grpSpPr>
+        <a:xfrm>
+          <a:off x="0" y="0"/>
+          <a:ext cx="0" cy="0"/>
+          <a:chOff x="0" y="0"/>
+          <a:chExt cx="0" cy="0"/>
+        </a:xfrm>
+      </p:grpSpPr>
+      <p:sp>
+        <p:nvSpPr>
+          <p:cNvPr id="2" name="Plassholder for innhold 1"/>
+          <p:cNvSpPr>
+            <a:spLocks noGrp="1"/>
+          </p:cNvSpPr>
+          <p:nvPr>
+            <p:ph idx="1"/>
+          </p:nvPr>
+        </p:nvSpPr>
+        <p:spPr>
+          <a:xfrm>
+            <a:off x="0" y="843558"/>
+            <a:ext cx="4572000" cy="4176463"/>
+          </a:xfrm>
+        </p:spPr>
+        <p:txBody>
+          <a:bodyPr/>
+          <a:lstStyle/>
+          <a:p>
+            <a:r>
+              <a:rPr lang="en-US" dirty="0" smtClean="0"/>
+              <a:t>Intelligence agency that supports operations</a:t>
+            </a:r>
+          </a:p>
+          <a:p>
+            <a:r>
+              <a:rPr lang="en-US" dirty="0" smtClean="0"/>
+              <a:t>Volunteer 132</a:t>
+            </a:r>
+            <a:r>
+              <a:rPr lang="en-US" baseline="30000" dirty="0" smtClean="0"/>
+              <a:t>nd</a:t>
+            </a:r>
+            <a:r>
+              <a:rPr lang="en-US" dirty="0" smtClean="0"/>
+              <a:t> members</a:t>
+            </a:r>
+          </a:p>
+          <a:p>
+            <a:r>
+              <a:rPr lang="en-US" dirty="0" smtClean="0"/>
+              <a:t>Most of the operation will intelligence driven, and that intelligence will come from events.</a:t>
+            </a:r>
+          </a:p>
+          <a:p>
+            <a:endParaRPr lang="en-US" dirty="0" smtClean="0"/>
+          </a:p>
+          <a:p>
+            <a:pPr>
+              <a:buNone/>
+            </a:pPr>
+            <a:r>
+              <a:rPr lang="en-US" dirty="0" smtClean="0"/>
+              <a:t>For details:</a:t>
+            </a:r>
+          </a:p>
+          <a:p>
+            <a:r>
+              <a:rPr lang="en-US" dirty="0" smtClean="0"/>
+              <a:t>See VIS Instructions (LINK)</a:t>
+            </a:r>
+          </a:p>
+        </p:txBody>
+      </p:sp>
+      <p:sp>
+        <p:nvSpPr>
+          <p:cNvPr id="3" name="Tittel 2"/>
+          <p:cNvSpPr>
+            <a:spLocks noGrp="1"/>
+          </p:cNvSpPr>
+          <p:nvPr>
+            <p:ph type="title"/>
+          </p:nvPr>
+        </p:nvSpPr>
+        <p:spPr/>
+        <p:txBody>
+          <a:bodyPr/>
+          <a:lstStyle/>
+          <a:p>
+            <a:r>
+              <a:rPr lang="en-US" dirty="0" smtClean="0"/>
+              <a:t>VIS</a:t>
+            </a:r>
+            <a:endParaRPr lang="en-US" dirty="0"/>
+          </a:p>
+        </p:txBody>
+      </p:sp>
+      <p:pic>
+        <p:nvPicPr>
+          <p:cNvPr id="4" name="Bilde 3" descr="C:\Users\Sjefen\Desktop\OPUF VIS logo\Virtual_Intelligence_Service_only_logo.PNG"/>
+          <p:cNvPicPr/>
+          <p:nvPr/>
+        </p:nvPicPr>
+        <p:blipFill>
+          <a:blip r:embed="rId2" cstate="print"/>
+          <a:srcRect/>
+          <a:stretch>
+            <a:fillRect/>
+          </a:stretch>
+        </p:blipFill>
+        <p:spPr bwMode="auto">
+          <a:xfrm>
+            <a:off x="5724128" y="1419622"/>
+            <a:ext cx="2696716" cy="2304256"/>
+          </a:xfrm>
+          <a:prstGeom prst="rect">
+            <a:avLst/>
+          </a:prstGeom>
+          <a:noFill/>
+        </p:spPr>
+      </p:pic>
+    </p:spTree>
+  </p:cSld>
+  <p:clrMapOvr>
+    <a:masterClrMapping/>
+  </p:clrMapOvr>
+</p:sld>
+</file>
+
+<file path=ppt/slides/slide17.xml><?xml version="1.0" encoding="utf-8"?>
+<p:sld xmlns:a="http://schemas.openxmlformats.org/drawingml/2006/main" xmlns:r="http://schemas.openxmlformats.org/officeDocument/2006/relationships" xmlns:p="http://schemas.openxmlformats.org/presentationml/2006/main">
+  <p:cSld>
+    <p:spTree>
+      <p:nvGrpSpPr>
+        <p:cNvPr id="1" name=""/>
+        <p:cNvGrpSpPr/>
+        <p:nvPr/>
+      </p:nvGrpSpPr>
+      <p:grpSpPr>
+        <a:xfrm>
+          <a:off x="0" y="0"/>
+          <a:ext cx="0" cy="0"/>
+          <a:chOff x="0" y="0"/>
+          <a:chExt cx="0" cy="0"/>
+        </a:xfrm>
+      </p:grpSpPr>
+      <p:sp>
+        <p:nvSpPr>
+          <p:cNvPr id="2" name="Plassholder for innhold 1"/>
+          <p:cNvSpPr>
+            <a:spLocks noGrp="1"/>
+          </p:cNvSpPr>
+          <p:nvPr>
+            <p:ph idx="1"/>
+          </p:nvPr>
+        </p:nvSpPr>
+        <p:spPr>
+          <a:xfrm>
+            <a:off x="0" y="843558"/>
+            <a:ext cx="9144000" cy="4176463"/>
+          </a:xfrm>
+        </p:spPr>
+        <p:txBody>
+          <a:bodyPr>
+            <a:normAutofit lnSpcReduction="10000"/>
+          </a:bodyPr>
+          <a:lstStyle/>
+          <a:p>
+            <a:r>
+              <a:rPr lang="en-US" dirty="0" smtClean="0"/>
+              <a:t>CJTF-82 Operation order (OPORDER)</a:t>
+            </a:r>
+          </a:p>
+          <a:p>
+            <a:r>
+              <a:rPr lang="en-US" dirty="0" smtClean="0"/>
+              <a:t>JFACC Joint Air Operations Plan</a:t>
+            </a:r>
+          </a:p>
+          <a:p>
+            <a:r>
+              <a:rPr lang="en-US" dirty="0" smtClean="0"/>
+              <a:t>Air Operations Directive (AOD)</a:t>
+            </a:r>
+          </a:p>
+          <a:p>
+            <a:r>
+              <a:rPr lang="en-US" dirty="0" smtClean="0"/>
+              <a:t>Joint Target List</a:t>
+            </a:r>
+          </a:p>
+          <a:p>
+            <a:r>
+              <a:rPr lang="en-US" dirty="0" smtClean="0"/>
+              <a:t>Joint Prioritized Target List</a:t>
+            </a:r>
+          </a:p>
+          <a:p>
+            <a:r>
+              <a:rPr lang="en-US" dirty="0" smtClean="0"/>
+              <a:t>TST Matrix</a:t>
+            </a:r>
+          </a:p>
+          <a:p>
+            <a:r>
+              <a:rPr lang="en-US" dirty="0" smtClean="0"/>
+              <a:t>Intelligence Report (INTREP)</a:t>
+            </a:r>
+          </a:p>
+          <a:p>
+            <a:pPr lvl="1"/>
+            <a:r>
+              <a:rPr lang="en-US" dirty="0" smtClean="0"/>
+              <a:t>Basic </a:t>
+            </a:r>
+            <a:r>
+              <a:rPr lang="en-US" dirty="0" err="1" smtClean="0"/>
+              <a:t>Intrep</a:t>
+            </a:r>
+            <a:r>
+              <a:rPr lang="en-US" dirty="0" smtClean="0"/>
+              <a:t> (Common to all 132</a:t>
+            </a:r>
+            <a:r>
+              <a:rPr lang="en-US" baseline="30000" dirty="0" smtClean="0"/>
+              <a:t>nd</a:t>
+            </a:r>
+            <a:r>
+              <a:rPr lang="en-US" dirty="0" smtClean="0"/>
+              <a:t> events)</a:t>
+            </a:r>
+          </a:p>
+          <a:p>
+            <a:pPr lvl="1"/>
+            <a:r>
+              <a:rPr lang="en-US" dirty="0" smtClean="0"/>
+              <a:t>OPAR specific reports (Specific to OPAR only)</a:t>
+            </a:r>
+          </a:p>
+          <a:p>
+            <a:r>
+              <a:rPr lang="en-US" dirty="0" smtClean="0"/>
+              <a:t>Intelligence Summary (INTSUM)</a:t>
+            </a:r>
+          </a:p>
+          <a:p>
+            <a:r>
+              <a:rPr lang="en-US" dirty="0" smtClean="0"/>
+              <a:t>Target Folder (TF)</a:t>
+            </a:r>
+          </a:p>
+          <a:p>
+            <a:r>
+              <a:rPr lang="en-US" dirty="0" smtClean="0"/>
+              <a:t>SPINS (Special Instructions)</a:t>
+            </a:r>
+          </a:p>
+        </p:txBody>
+      </p:sp>
+      <p:sp>
+        <p:nvSpPr>
+          <p:cNvPr id="3" name="Tittel 2"/>
+          <p:cNvSpPr>
+            <a:spLocks noGrp="1"/>
+          </p:cNvSpPr>
+          <p:nvPr>
+            <p:ph type="title"/>
+          </p:nvPr>
+        </p:nvSpPr>
+        <p:spPr/>
+        <p:txBody>
+          <a:bodyPr/>
+          <a:lstStyle/>
+          <a:p>
+            <a:r>
+              <a:rPr lang="en-US" dirty="0" smtClean="0"/>
+              <a:t>PRODUCTS</a:t>
+            </a:r>
+            <a:endParaRPr lang="en-US" dirty="0"/>
+          </a:p>
+        </p:txBody>
+      </p:sp>
+    </p:spTree>
+  </p:cSld>
+  <p:clrMapOvr>
+    <a:masterClrMapping/>
+  </p:clrMapOvr>
+</p:sld>
+</file>
+
+<file path=ppt/slides/slide18.xml><?xml version="1.0" encoding="utf-8"?>
+<p:sld xmlns:a="http://schemas.openxmlformats.org/drawingml/2006/main" xmlns:r="http://schemas.openxmlformats.org/officeDocument/2006/relationships" xmlns:p="http://schemas.openxmlformats.org/presentationml/2006/main">
+  <p:cSld>
+    <p:spTree>
+      <p:nvGrpSpPr>
+        <p:cNvPr id="1" name=""/>
+        <p:cNvGrpSpPr/>
+        <p:nvPr/>
+      </p:nvGrpSpPr>
+      <p:grpSpPr>
+        <a:xfrm>
+          <a:off x="0" y="0"/>
+          <a:ext cx="0" cy="0"/>
+          <a:chOff x="0" y="0"/>
+          <a:chExt cx="0" cy="0"/>
+        </a:xfrm>
+      </p:grpSpPr>
+      <p:sp>
+        <p:nvSpPr>
+          <p:cNvPr id="2" name="Plassholder for innhold 1"/>
+          <p:cNvSpPr>
+            <a:spLocks noGrp="1"/>
+          </p:cNvSpPr>
+          <p:nvPr>
+            <p:ph idx="1"/>
+          </p:nvPr>
+        </p:nvSpPr>
+        <p:spPr>
+          <a:xfrm>
+            <a:off x="0" y="843558"/>
+            <a:ext cx="9144000" cy="4176463"/>
+          </a:xfrm>
+        </p:spPr>
+        <p:txBody>
+          <a:bodyPr/>
+          <a:lstStyle/>
+          <a:p>
+            <a:pPr lvl="0">
+              <a:buNone/>
+            </a:pPr>
+            <a:r>
+              <a:rPr lang="en-US" dirty="0" smtClean="0"/>
+              <a:t>- Minimum 14 days between each event (real world days)</a:t>
+            </a:r>
+          </a:p>
+          <a:p>
+            <a:pPr lvl="0">
+              <a:buNone/>
+            </a:pPr>
+            <a:r>
+              <a:rPr lang="en-US" dirty="0" smtClean="0"/>
+              <a:t>- Each event takes place on a day in the campaign</a:t>
+            </a:r>
+          </a:p>
+          <a:p>
+            <a:pPr lvl="0">
+              <a:buNone/>
+            </a:pPr>
+            <a:endParaRPr lang="en-US" dirty="0" smtClean="0"/>
+          </a:p>
+          <a:p>
+            <a:pPr lvl="0"/>
+            <a:r>
+              <a:rPr lang="en-US" sz="1600" dirty="0" smtClean="0"/>
+              <a:t>Day 1: Event, campaign day 1 (Sunday)</a:t>
+            </a:r>
+            <a:endParaRPr lang="nb-NO" sz="1600" dirty="0" smtClean="0"/>
+          </a:p>
+          <a:p>
+            <a:pPr lvl="0"/>
+            <a:r>
+              <a:rPr lang="en-US" sz="1600" dirty="0" smtClean="0"/>
+              <a:t>Day 2: AARs and BDAs to be provided by pilots (Monday)</a:t>
+            </a:r>
+            <a:endParaRPr lang="nb-NO" sz="1600" dirty="0" smtClean="0"/>
+          </a:p>
+          <a:p>
+            <a:pPr lvl="0"/>
+            <a:r>
+              <a:rPr lang="en-US" sz="1600" dirty="0" smtClean="0"/>
+              <a:t>Day 3-8: VIS production and publish new INTSUM NLT Day 8 (Monday)</a:t>
+            </a:r>
+            <a:endParaRPr lang="nb-NO" sz="1600" dirty="0" smtClean="0"/>
+          </a:p>
+          <a:p>
+            <a:pPr lvl="0"/>
+            <a:r>
+              <a:rPr lang="en-US" sz="1600" dirty="0" smtClean="0"/>
+              <a:t>Day 8-12: JFACC guidance to AOC (publish new AOD, NLT Day 12, Friday) (supported by VIS throughout)</a:t>
+            </a:r>
+            <a:endParaRPr lang="nb-NO" sz="1600" dirty="0" smtClean="0"/>
+          </a:p>
+          <a:p>
+            <a:pPr lvl="0"/>
+            <a:r>
+              <a:rPr lang="en-US" sz="1600" dirty="0" smtClean="0"/>
+              <a:t>Day 12: AOC work day: </a:t>
+            </a:r>
+            <a:r>
+              <a:rPr lang="en-US" sz="1600" dirty="0" err="1" smtClean="0"/>
+              <a:t>Taskings</a:t>
+            </a:r>
+            <a:r>
+              <a:rPr lang="en-US" sz="1600" dirty="0" smtClean="0"/>
+              <a:t>/briefing/assignments (Friday)</a:t>
+            </a:r>
+            <a:endParaRPr lang="nb-NO" sz="1600" dirty="0" smtClean="0"/>
+          </a:p>
+          <a:p>
+            <a:pPr lvl="0"/>
+            <a:r>
+              <a:rPr lang="en-US" sz="1600" dirty="0" smtClean="0"/>
+              <a:t>Day 13+14: Pilots planning days</a:t>
+            </a:r>
+            <a:endParaRPr lang="nb-NO" sz="1600" dirty="0" smtClean="0"/>
+          </a:p>
+          <a:p>
+            <a:pPr lvl="0"/>
+            <a:r>
+              <a:rPr lang="en-US" sz="1600" dirty="0" smtClean="0"/>
+              <a:t>Day 14: Event, campaign day 2 (Sunday)</a:t>
+            </a:r>
+            <a:endParaRPr lang="nb-NO" sz="1600" dirty="0"/>
+          </a:p>
+        </p:txBody>
+      </p:sp>
+      <p:sp>
+        <p:nvSpPr>
+          <p:cNvPr id="3" name="Tittel 2"/>
+          <p:cNvSpPr>
+            <a:spLocks noGrp="1"/>
+          </p:cNvSpPr>
+          <p:nvPr>
+            <p:ph type="title"/>
+          </p:nvPr>
+        </p:nvSpPr>
+        <p:spPr/>
+        <p:txBody>
+          <a:bodyPr/>
+          <a:lstStyle/>
+          <a:p>
+            <a:r>
+              <a:rPr lang="en-US" dirty="0" smtClean="0"/>
+              <a:t>GENERIC TIMELINE</a:t>
+            </a:r>
+            <a:endParaRPr lang="en-US" dirty="0"/>
+          </a:p>
+        </p:txBody>
+      </p:sp>
+    </p:spTree>
+  </p:cSld>
+  <p:clrMapOvr>
+    <a:masterClrMapping/>
+  </p:clrMapOvr>
+</p:sld>
+</file>
+
+<file path=ppt/slides/slide19.xml><?xml version="1.0" encoding="utf-8"?>
+<p:sld xmlns:a="http://schemas.openxmlformats.org/drawingml/2006/main" xmlns:r="http://schemas.openxmlformats.org/officeDocument/2006/relationships" xmlns:p="http://schemas.openxmlformats.org/presentationml/2006/main">
+  <p:cSld>
+    <p:spTree>
+      <p:nvGrpSpPr>
+        <p:cNvPr id="1" name=""/>
+        <p:cNvGrpSpPr/>
+        <p:nvPr/>
+      </p:nvGrpSpPr>
+      <p:grpSpPr>
+        <a:xfrm>
+          <a:off x="0" y="0"/>
+          <a:ext cx="0" cy="0"/>
+          <a:chOff x="0" y="0"/>
+          <a:chExt cx="0" cy="0"/>
+        </a:xfrm>
+      </p:grpSpPr>
+      <p:sp>
+        <p:nvSpPr>
+          <p:cNvPr id="2" name="Plassholder for innhold 1"/>
+          <p:cNvSpPr>
+            <a:spLocks noGrp="1"/>
+          </p:cNvSpPr>
+          <p:nvPr>
+            <p:ph idx="1"/>
+          </p:nvPr>
+        </p:nvSpPr>
+        <p:spPr>
+          <a:xfrm>
+            <a:off x="0" y="843558"/>
             <a:ext cx="9144000" cy="4176463"/>
           </a:xfrm>
         </p:spPr>
@@ -4299,7 +5196,94 @@
           <a:bodyPr/>
           <a:lstStyle/>
           <a:p>
-            <a:endParaRPr lang="en-US"/>
+            <a:pPr marL="0" indent="0">
+              <a:buNone/>
+            </a:pPr>
+            <a:r>
+              <a:rPr lang="en-US" b="1" dirty="0" smtClean="0"/>
+              <a:t>US / China conflict in the South China Sea</a:t>
+            </a:r>
+          </a:p>
+          <a:p>
+            <a:pPr algn="just"/>
+            <a:r>
+              <a:rPr lang="en-US" sz="1800" dirty="0" smtClean="0"/>
+              <a:t>After </a:t>
+            </a:r>
+            <a:r>
+              <a:rPr lang="en-US" sz="1800" dirty="0"/>
+              <a:t>months of deteriorating in relations between US and China, the situation escalated a few weeks ago fighting broke out between </a:t>
+            </a:r>
+            <a:r>
+              <a:rPr lang="en-US" sz="1800" dirty="0" smtClean="0"/>
+              <a:t>Chinese </a:t>
+            </a:r>
+            <a:r>
+              <a:rPr lang="en-US" sz="1800" dirty="0"/>
+              <a:t>and US fleets in the South China </a:t>
+            </a:r>
+            <a:r>
+              <a:rPr lang="en-US" sz="1800" dirty="0" smtClean="0"/>
+              <a:t>Sea.</a:t>
+            </a:r>
+          </a:p>
+          <a:p>
+            <a:pPr algn="just"/>
+            <a:r>
+              <a:rPr lang="en-US" sz="1800" dirty="0" smtClean="0"/>
+              <a:t>While </a:t>
+            </a:r>
+            <a:r>
+              <a:rPr lang="en-US" sz="1800" dirty="0"/>
+              <a:t>both sides are trying to contain the conflict and prevent it from escalating, both China and the US has been reinforcing their bases in the </a:t>
+            </a:r>
+            <a:r>
+              <a:rPr lang="en-US" sz="1800" dirty="0" smtClean="0"/>
+              <a:t>region.</a:t>
+            </a:r>
+          </a:p>
+          <a:p>
+            <a:pPr algn="just"/>
+            <a:r>
+              <a:rPr lang="en-US" sz="1800" dirty="0" smtClean="0"/>
+              <a:t>Russia </a:t>
+            </a:r>
+            <a:r>
+              <a:rPr lang="en-US" sz="1800" dirty="0"/>
+              <a:t>has declared </a:t>
+            </a:r>
+            <a:r>
+              <a:rPr lang="en-US" sz="1800" dirty="0" smtClean="0"/>
+              <a:t>its full </a:t>
+            </a:r>
+            <a:r>
+              <a:rPr lang="en-US" sz="1800" dirty="0"/>
+              <a:t>support in </a:t>
+            </a:r>
+            <a:r>
+              <a:rPr lang="en-US" sz="1800" dirty="0" smtClean="0"/>
+              <a:t>Chinese territorial </a:t>
+            </a:r>
+            <a:r>
+              <a:rPr lang="en-US" sz="1800" dirty="0"/>
+              <a:t>claims and condemned US "Western intervention in Asia's </a:t>
+            </a:r>
+            <a:r>
+              <a:rPr lang="en-US" sz="1800" dirty="0" smtClean="0"/>
+              <a:t>affairs“</a:t>
+            </a:r>
+          </a:p>
+          <a:p>
+            <a:pPr algn="just"/>
+            <a:r>
+              <a:rPr lang="en-US" sz="1800" dirty="0" smtClean="0"/>
+              <a:t>As </a:t>
+            </a:r>
+            <a:r>
+              <a:rPr lang="en-US" sz="1800" dirty="0"/>
+              <a:t>of this time there's no clear end to the conflict and we can expect the US to focus its attention - both in the diplomatic arena as well as the prioritization of military and economical assets - in South-East Asia rather than the Middle-East.</a:t>
+            </a:r>
+            <a:endParaRPr lang="en-US" sz="1800" dirty="0"/>
           </a:p>
         </p:txBody>
       </p:sp>
@@ -4320,7 +5304,7 @@
           <a:p>
             <a:r>
               <a:rPr lang="en-US" dirty="0" smtClean="0"/>
-              <a:t>SITUATION</a:t>
+              <a:t>SITUATION – US / China</a:t>
             </a:r>
             <a:endParaRPr lang="en-US" dirty="0"/>
           </a:p>
@@ -4361,112 +5345,90 @@
             <p:ph idx="1"/>
           </p:nvPr>
         </p:nvSpPr>
-        <p:spPr>
-          <a:xfrm>
-            <a:off x="0" y="771550"/>
-            <a:ext cx="9036496" cy="2448272"/>
-          </a:xfrm>
-        </p:spPr>
+        <p:spPr/>
         <p:txBody>
           <a:bodyPr>
-            <a:normAutofit/>
+            <a:normAutofit fontScale="85000" lnSpcReduction="10000"/>
           </a:bodyPr>
           <a:lstStyle/>
           <a:p>
-            <a:r>
-              <a:rPr lang="en-US" dirty="0" smtClean="0"/>
-              <a:t>Combined Joint Task Force Headquarter (CJTF HQ): Mission makes/event hosts</a:t>
-            </a:r>
-          </a:p>
-          <a:p>
-            <a:r>
-              <a:rPr lang="en-US" b="1" dirty="0" smtClean="0"/>
-              <a:t>Joint Force Air Component Commander (JFACC): Volunteer 132</a:t>
-            </a:r>
-            <a:r>
-              <a:rPr lang="en-US" b="1" baseline="30000" dirty="0" smtClean="0"/>
-              <a:t>nd</a:t>
-            </a:r>
-            <a:r>
-              <a:rPr lang="en-US" b="1" dirty="0" smtClean="0"/>
-              <a:t> members</a:t>
-            </a:r>
-          </a:p>
-          <a:p>
-            <a:r>
-              <a:rPr lang="en-US" dirty="0" smtClean="0"/>
-              <a:t>Air Operations Centre (AOC): </a:t>
-            </a:r>
-            <a:r>
-              <a:rPr lang="en-US" dirty="0" smtClean="0"/>
-              <a:t>Mission makes/event </a:t>
-            </a:r>
-            <a:r>
-              <a:rPr lang="en-US" dirty="0" smtClean="0"/>
-              <a:t>hosts</a:t>
-            </a:r>
-          </a:p>
-          <a:p>
-            <a:r>
-              <a:rPr lang="en-US" dirty="0" smtClean="0"/>
-              <a:t>Virtual Intelligence Directorate (VID): Mission makes/event </a:t>
-            </a:r>
-            <a:r>
-              <a:rPr lang="en-US" dirty="0" smtClean="0"/>
-              <a:t>hosts</a:t>
-            </a:r>
-          </a:p>
-          <a:p>
-            <a:r>
-              <a:rPr lang="en-US" b="1" dirty="0" smtClean="0"/>
-              <a:t>Virtual Intelligence Service (VIS): </a:t>
-            </a:r>
-            <a:r>
-              <a:rPr lang="en-US" b="1" dirty="0" smtClean="0"/>
-              <a:t>Volunteer 132</a:t>
-            </a:r>
-            <a:r>
-              <a:rPr lang="en-US" b="1" baseline="30000" dirty="0" smtClean="0"/>
-              <a:t>nd</a:t>
-            </a:r>
-            <a:r>
-              <a:rPr lang="en-US" b="1" dirty="0" smtClean="0"/>
-              <a:t> members</a:t>
-            </a:r>
-            <a:endParaRPr lang="en-US" b="1" dirty="0" smtClean="0"/>
-          </a:p>
-          <a:p>
-            <a:pPr>
+            <a:pPr marL="0" indent="0">
               <a:buNone/>
             </a:pPr>
+            <a:r>
+              <a:rPr lang="en-US" sz="2400" b="1" dirty="0"/>
+              <a:t>Syria</a:t>
+            </a:r>
+          </a:p>
+          <a:p>
+            <a:r>
+              <a:rPr lang="en-US" dirty="0" smtClean="0"/>
+              <a:t>The Syrian leadership party has gone weaker in past months and is seeking to re-affirm itself as strong and aggressive by pursuing a militant stance.</a:t>
+            </a:r>
+          </a:p>
+          <a:p>
+            <a:r>
+              <a:rPr lang="en-US" dirty="0" smtClean="0"/>
+              <a:t>With intent to gain access to more economical assets and becoming a dominant , regional superpower, Syria set an ambitious goal to launch a major military campaign against its historical enemies in Turkey and Israel.</a:t>
+            </a:r>
+          </a:p>
+          <a:p>
+            <a:r>
+              <a:rPr lang="en-US" dirty="0" smtClean="0"/>
+              <a:t>This approach become more appealing with the US being occupied with its conflict with China and lack of apparent interest in Middle-East affairs</a:t>
+            </a:r>
+          </a:p>
+          <a:p>
+            <a:r>
+              <a:rPr lang="en-US" dirty="0" smtClean="0"/>
+              <a:t>In the recent years, Syria has been hosting large numbers of foreign military units:</a:t>
+            </a:r>
+          </a:p>
+          <a:p>
+            <a:pPr lvl="1"/>
+            <a:r>
+              <a:rPr lang="en-US" dirty="0" smtClean="0"/>
+              <a:t>Russian air force has been staging in Syrian airbases as part of a strategic agreement of providing Russia with a naval base at TARTOS (The only Russian fleet large port in the Mediterranean)</a:t>
+            </a:r>
+          </a:p>
+          <a:p>
+            <a:pPr lvl="1"/>
+            <a:r>
+              <a:rPr lang="en-US" dirty="0"/>
+              <a:t>Iranian revolutionary guards are very active in establishing bases to be used for possible operations against Israel in the event of a conflict between the two countries. Those bases and efforts have been the targets of numerous air raids by Israeli air force.</a:t>
+            </a:r>
+          </a:p>
+        </p:txBody>
+      </p:sp>
+      <p:sp>
+        <p:nvSpPr>
+          <p:cNvPr id="3" name="Tittel 2"/>
+          <p:cNvSpPr>
+            <a:spLocks noGrp="1"/>
+          </p:cNvSpPr>
+          <p:nvPr>
+            <p:ph type="title"/>
+          </p:nvPr>
+        </p:nvSpPr>
+        <p:spPr/>
+        <p:txBody>
+          <a:bodyPr/>
+          <a:lstStyle/>
+          <a:p>
+            <a:r>
+              <a:rPr lang="en-US" dirty="0" smtClean="0"/>
+              <a:t>SITUATION - Syria</a:t>
+            </a:r>
             <a:endParaRPr lang="en-US" dirty="0"/>
           </a:p>
         </p:txBody>
       </p:sp>
-      <p:sp>
-        <p:nvSpPr>
-          <p:cNvPr id="3" name="Tittel 2"/>
-          <p:cNvSpPr>
-            <a:spLocks noGrp="1"/>
-          </p:cNvSpPr>
-          <p:nvPr>
-            <p:ph type="title"/>
-          </p:nvPr>
-        </p:nvSpPr>
-        <p:spPr/>
-        <p:txBody>
-          <a:bodyPr/>
-          <a:lstStyle/>
-          <a:p>
-            <a:r>
-              <a:rPr lang="en-US" dirty="0" smtClean="0"/>
-              <a:t>FUNCTIONS / ROLES </a:t>
-            </a:r>
-            <a:endParaRPr lang="en-US" dirty="0"/>
-          </a:p>
-        </p:txBody>
-      </p:sp>
     </p:spTree>
+    <p:extLst>
+      <p:ext uri="{BB962C8B-B14F-4D97-AF65-F5344CB8AC3E}">
+        <p14:creationId xmlns:p14="http://schemas.microsoft.com/office/powerpoint/2010/main" val="3364509942"/>
+      </p:ext>
+    </p:extLst>
   </p:cSld>
   <p:clrMapOvr>
     <a:masterClrMapping/>
@@ -4501,34 +5463,86 @@
             <p:ph idx="1"/>
           </p:nvPr>
         </p:nvSpPr>
-        <p:spPr>
-          <a:xfrm>
-            <a:off x="0" y="843558"/>
-            <a:ext cx="4572000" cy="4176463"/>
-          </a:xfrm>
-        </p:spPr>
-        <p:txBody>
-          <a:bodyPr/>
-          <a:lstStyle/>
-          <a:p>
-            <a:r>
-              <a:rPr lang="en-US" dirty="0" smtClean="0"/>
-              <a:t>Commander of the entire force (Both Air Sea and Ground)</a:t>
-            </a:r>
-          </a:p>
-          <a:p>
-            <a:r>
-              <a:rPr lang="en-US" dirty="0" smtClean="0"/>
-              <a:t>Mission designers /event host</a:t>
-            </a:r>
-          </a:p>
-          <a:p>
-            <a:r>
-              <a:rPr lang="en-US" dirty="0" smtClean="0"/>
-              <a:t>Ensures to streamline events</a:t>
-            </a:r>
-          </a:p>
-          <a:p>
+        <p:spPr/>
+        <p:txBody>
+          <a:bodyPr>
+            <a:normAutofit lnSpcReduction="10000"/>
+          </a:bodyPr>
+          <a:lstStyle/>
+          <a:p>
+            <a:pPr marL="0" indent="0">
+              <a:buNone/>
+            </a:pPr>
+            <a:r>
+              <a:rPr lang="en-US" b="1" dirty="0" smtClean="0"/>
+              <a:t>Syrian objectives in Turkey:</a:t>
+            </a:r>
+          </a:p>
+          <a:p>
+            <a:pPr marL="457200" indent="-457200">
+              <a:buFont typeface="+mj-lt"/>
+              <a:buAutoNum type="arabicPeriod"/>
+            </a:pPr>
+            <a:r>
+              <a:rPr lang="en-US" dirty="0" smtClean="0"/>
+              <a:t>Seize the ATATURK hydroelectric dam.</a:t>
+            </a:r>
+          </a:p>
+          <a:p>
+            <a:pPr marL="857250" lvl="1" indent="-457200">
+              <a:buFont typeface="+mj-lt"/>
+              <a:buAutoNum type="arabicPeriod"/>
+            </a:pPr>
+            <a:r>
+              <a:rPr lang="en-US" dirty="0" smtClean="0"/>
+              <a:t>The dam was a source of major dispute between the two countries since its building in the 1990s. </a:t>
+            </a:r>
+          </a:p>
+          <a:p>
+            <a:pPr marL="857250" lvl="1" indent="-457200">
+              <a:buFont typeface="+mj-lt"/>
+              <a:buAutoNum type="arabicPeriod"/>
+            </a:pPr>
+            <a:r>
+              <a:rPr lang="en-US" dirty="0" smtClean="0"/>
+              <a:t>Syria could gain a strategically important source of fresh water and electrical power from this asset while at the same time denying Turkey of a strategically important source those assets to the entire South-East area of the country.</a:t>
+            </a:r>
+          </a:p>
+          <a:p>
+            <a:pPr marL="457200" indent="-457200">
+              <a:buFont typeface="+mj-lt"/>
+              <a:buAutoNum type="arabicPeriod"/>
+            </a:pPr>
+            <a:r>
+              <a:rPr lang="en-US" dirty="0" smtClean="0"/>
+              <a:t>The area of ISKENDERUN: A large oil and gas production site. Denying this area from Turkey serves two more purposes: </a:t>
+            </a:r>
+          </a:p>
+          <a:p>
+            <a:pPr marL="857250" lvl="1" indent="-457200">
+              <a:buFont typeface="+mj-lt"/>
+              <a:buAutoNum type="arabicPeriod"/>
+            </a:pPr>
+            <a:r>
+              <a:rPr lang="en-US" dirty="0" smtClean="0"/>
+              <a:t>Denying a major sea-port which can otherwise be used to receive supplies/reinforcements closest to the ATATURK theater</a:t>
+            </a:r>
+          </a:p>
+          <a:p>
+            <a:pPr marL="857250" lvl="1" indent="-457200">
+              <a:buFont typeface="+mj-lt"/>
+              <a:buAutoNum type="arabicPeriod"/>
+            </a:pPr>
+            <a:r>
+              <a:rPr lang="en-US" dirty="0" smtClean="0"/>
+              <a:t>Closing a main road (O-52) which is expected to use as a primary resupply line to the ATATURK Theater</a:t>
+            </a:r>
+          </a:p>
+          <a:p>
+            <a:pPr marL="857250" lvl="1" indent="-457200">
+              <a:buFont typeface="+mj-lt"/>
+              <a:buAutoNum type="arabicPeriod"/>
+            </a:pPr>
             <a:endParaRPr lang="en-US" dirty="0"/>
           </a:p>
         </p:txBody>
@@ -4550,39 +5564,18 @@
           <a:p>
             <a:r>
               <a:rPr lang="en-US" dirty="0" smtClean="0"/>
-              <a:t>CJTF – 82  HQ</a:t>
+              <a:t>SITUATION - Syria</a:t>
             </a:r>
             <a:endParaRPr lang="en-US" dirty="0"/>
           </a:p>
         </p:txBody>
       </p:sp>
-      <p:pic>
-        <p:nvPicPr>
-          <p:cNvPr id="2050" name="Picture 2" descr="D:\DCS_Missions\OPAR-Brief\LOGOS\OPAR CJTF_82_Logo.png"/>
-          <p:cNvPicPr>
-            <a:picLocks noChangeAspect="1" noChangeArrowheads="1"/>
-          </p:cNvPicPr>
-          <p:nvPr/>
-        </p:nvPicPr>
-        <p:blipFill>
-          <a:blip r:embed="rId2" cstate="print"/>
-          <a:srcRect/>
-          <a:stretch>
-            <a:fillRect/>
-          </a:stretch>
-        </p:blipFill>
-        <p:spPr bwMode="auto">
-          <a:xfrm>
-            <a:off x="4751512" y="339502"/>
-            <a:ext cx="4392488" cy="4392488"/>
-          </a:xfrm>
-          <a:prstGeom prst="rect">
-            <a:avLst/>
-          </a:prstGeom>
-          <a:noFill/>
-        </p:spPr>
-      </p:pic>
     </p:spTree>
+    <p:extLst>
+      <p:ext uri="{BB962C8B-B14F-4D97-AF65-F5344CB8AC3E}">
+        <p14:creationId xmlns:p14="http://schemas.microsoft.com/office/powerpoint/2010/main" val="2171314024"/>
+      </p:ext>
+    </p:extLst>
   </p:cSld>
   <p:clrMapOvr>
     <a:masterClrMapping/>
@@ -4617,129 +5610,61 @@
             <p:ph idx="1"/>
           </p:nvPr>
         </p:nvSpPr>
-        <p:spPr>
-          <a:xfrm>
-            <a:off x="0" y="843558"/>
-            <a:ext cx="4572000" cy="4176463"/>
-          </a:xfrm>
-        </p:spPr>
-        <p:txBody>
-          <a:bodyPr/>
-          <a:lstStyle/>
-          <a:p>
-            <a:r>
-              <a:rPr lang="en-US" dirty="0" smtClean="0"/>
-              <a:t>Commander of Air Forces involved in the operation</a:t>
-            </a:r>
-          </a:p>
-          <a:p>
-            <a:r>
-              <a:rPr lang="en-US" dirty="0" smtClean="0"/>
-              <a:t>Volunteer 132</a:t>
-            </a:r>
-            <a:r>
-              <a:rPr lang="en-US" baseline="30000" dirty="0" smtClean="0"/>
-              <a:t>nd</a:t>
-            </a:r>
-            <a:r>
-              <a:rPr lang="en-US" dirty="0" smtClean="0"/>
-              <a:t> </a:t>
-            </a:r>
-            <a:r>
-              <a:rPr lang="en-US" dirty="0" smtClean="0"/>
-              <a:t>members</a:t>
-            </a:r>
-          </a:p>
-          <a:p>
-            <a:r>
-              <a:rPr lang="en-US" dirty="0" smtClean="0"/>
-              <a:t>Takes guidance from CJTF-82 HQ, available intelligence, with support from VIS to develop and execute the air campaign </a:t>
-            </a:r>
-          </a:p>
-          <a:p>
-            <a:endParaRPr lang="en-US" dirty="0" smtClean="0"/>
-          </a:p>
-          <a:p>
-            <a:endParaRPr lang="en-US" dirty="0" smtClean="0"/>
-          </a:p>
-          <a:p>
-            <a:pPr>
+        <p:spPr/>
+        <p:txBody>
+          <a:bodyPr>
+            <a:normAutofit/>
+          </a:bodyPr>
+          <a:lstStyle/>
+          <a:p>
+            <a:pPr marL="0" indent="0">
               <a:buNone/>
             </a:pPr>
             <a:r>
-              <a:rPr lang="en-US" dirty="0" smtClean="0"/>
-              <a:t>For details:</a:t>
-            </a:r>
-          </a:p>
-          <a:p>
-            <a:r>
-              <a:rPr lang="en-US" dirty="0" smtClean="0"/>
-              <a:t>See </a:t>
-            </a:r>
-            <a:r>
-              <a:rPr lang="en-US" dirty="0" smtClean="0"/>
-              <a:t>JFACC Instructions (LINK)</a:t>
-            </a:r>
-            <a:endParaRPr lang="en-US" dirty="0" smtClean="0"/>
-          </a:p>
-          <a:p>
-            <a:endParaRPr lang="en-US" dirty="0" smtClean="0"/>
-          </a:p>
-          <a:p>
+              <a:rPr lang="en-US" b="1" dirty="0" smtClean="0"/>
+              <a:t>Syrian objective in Israel:</a:t>
+            </a:r>
+          </a:p>
+          <a:p>
+            <a:pPr marL="0" indent="0">
+              <a:buNone/>
+            </a:pPr>
+            <a:r>
+              <a:rPr lang="en-US" dirty="0" smtClean="0"/>
+              <a:t>Re-taking the entire Golan Heights (GH) from Israeli occupation would greatly improve the prestige of the government to the Syrian people. It would also raise Syrian power in the middle-east as a first Arab country that would be able to act by force and gain a territorial victory against Israel after dozens of years of conflicts and place Syria as a regional superpower.</a:t>
+            </a:r>
+          </a:p>
+        </p:txBody>
+      </p:sp>
+      <p:sp>
+        <p:nvSpPr>
+          <p:cNvPr id="3" name="Tittel 2"/>
+          <p:cNvSpPr>
+            <a:spLocks noGrp="1"/>
+          </p:cNvSpPr>
+          <p:nvPr>
+            <p:ph type="title"/>
+          </p:nvPr>
+        </p:nvSpPr>
+        <p:spPr/>
+        <p:txBody>
+          <a:bodyPr/>
+          <a:lstStyle/>
+          <a:p>
+            <a:r>
+              <a:rPr lang="en-US" dirty="0" smtClean="0"/>
+              <a:t>SITUATION - Syria</a:t>
+            </a:r>
             <a:endParaRPr lang="en-US" dirty="0"/>
           </a:p>
         </p:txBody>
       </p:sp>
-      <p:sp>
-        <p:nvSpPr>
-          <p:cNvPr id="3" name="Tittel 2"/>
-          <p:cNvSpPr>
-            <a:spLocks noGrp="1"/>
-          </p:cNvSpPr>
-          <p:nvPr>
-            <p:ph type="title"/>
-          </p:nvPr>
-        </p:nvSpPr>
-        <p:spPr/>
-        <p:txBody>
-          <a:bodyPr/>
-          <a:lstStyle/>
-          <a:p>
-            <a:r>
-              <a:rPr lang="en-US" dirty="0" smtClean="0"/>
-              <a:t>JFACC</a:t>
-            </a:r>
-            <a:endParaRPr lang="en-US" dirty="0"/>
-          </a:p>
-        </p:txBody>
-      </p:sp>
-      <p:pic>
-        <p:nvPicPr>
-          <p:cNvPr id="3074" name="Picture 2" descr="D:\DCS_Missions\OPAR-Brief\LOGOS\OPAR JFACC logo.png"/>
-          <p:cNvPicPr>
-            <a:picLocks noChangeAspect="1" noChangeArrowheads="1"/>
-          </p:cNvPicPr>
-          <p:nvPr/>
-        </p:nvPicPr>
-        <p:blipFill>
-          <a:blip r:embed="rId2" cstate="print"/>
-          <a:srcRect/>
-          <a:stretch>
-            <a:fillRect/>
-          </a:stretch>
-        </p:blipFill>
-        <p:spPr bwMode="auto">
-          <a:xfrm>
-            <a:off x="5292080" y="987574"/>
-            <a:ext cx="3483212" cy="3556447"/>
-          </a:xfrm>
-          <a:prstGeom prst="rect">
-            <a:avLst/>
-          </a:prstGeom>
-          <a:noFill/>
-        </p:spPr>
-      </p:pic>
     </p:spTree>
+    <p:extLst>
+      <p:ext uri="{BB962C8B-B14F-4D97-AF65-F5344CB8AC3E}">
+        <p14:creationId xmlns:p14="http://schemas.microsoft.com/office/powerpoint/2010/main" val="3216514010"/>
+      </p:ext>
+    </p:extLst>
   </p:cSld>
   <p:clrMapOvr>
     <a:masterClrMapping/>
@@ -4774,60 +5699,153 @@
             <p:ph idx="1"/>
           </p:nvPr>
         </p:nvSpPr>
-        <p:spPr>
-          <a:xfrm>
-            <a:off x="0" y="843558"/>
-            <a:ext cx="4572000" cy="4176463"/>
-          </a:xfrm>
-        </p:spPr>
-        <p:txBody>
-          <a:bodyPr/>
-          <a:lstStyle/>
-          <a:p>
-            <a:r>
-              <a:rPr lang="en-US" dirty="0" smtClean="0"/>
-              <a:t>Translates JFACC daily guidance into a executable Air Tasking Order</a:t>
-            </a:r>
-          </a:p>
-          <a:p>
-            <a:r>
-              <a:rPr lang="en-US" dirty="0" smtClean="0"/>
-              <a:t>Mission designers /event host</a:t>
-            </a:r>
-          </a:p>
-          <a:p>
-            <a:r>
-              <a:rPr lang="en-US" dirty="0" smtClean="0"/>
-              <a:t>Ensures to streamline events</a:t>
+        <p:spPr/>
+        <p:txBody>
+          <a:bodyPr/>
+          <a:lstStyle/>
+          <a:p>
+            <a:pPr marL="0" indent="0">
+              <a:buNone/>
+            </a:pPr>
+            <a:r>
+              <a:rPr lang="en-US" b="1" dirty="0" smtClean="0"/>
+              <a:t>Israel</a:t>
+            </a:r>
+          </a:p>
+          <a:p>
+            <a:r>
+              <a:rPr lang="en-US" dirty="0" smtClean="0"/>
+              <a:t>The </a:t>
+            </a:r>
+            <a:r>
+              <a:rPr lang="en-US" dirty="0"/>
+              <a:t>Israeli Defense Force (IDF) has been has been undergoing a slow transformation since the 2006 war in Lebanon. More effort spent on training for counter-guerrilla scenarios and reduced focus on large-scale combat scenarios as are expected against the Syrian armed </a:t>
+            </a:r>
+            <a:r>
+              <a:rPr lang="en-US" dirty="0" smtClean="0"/>
+              <a:t>forces.</a:t>
+            </a:r>
+          </a:p>
+          <a:p>
+            <a:r>
+              <a:rPr lang="en-US" dirty="0" smtClean="0"/>
+              <a:t>Israeli </a:t>
+            </a:r>
+            <a:r>
+              <a:rPr lang="en-US" dirty="0"/>
+              <a:t>air-force </a:t>
+            </a:r>
+            <a:r>
+              <a:rPr lang="en-US" dirty="0" smtClean="0"/>
+              <a:t>(IAF) is conducting frequent </a:t>
+            </a:r>
+            <a:r>
+              <a:rPr lang="en-US" dirty="0"/>
+              <a:t>air-raids </a:t>
+            </a:r>
+            <a:r>
+              <a:rPr lang="en-US" dirty="0" smtClean="0"/>
+              <a:t>against </a:t>
+            </a:r>
+            <a:r>
+              <a:rPr lang="en-US" dirty="0"/>
+              <a:t>Iranian </a:t>
+            </a:r>
+            <a:r>
+              <a:rPr lang="en-US" dirty="0" smtClean="0"/>
+              <a:t>targets entering </a:t>
+            </a:r>
+            <a:r>
+              <a:rPr lang="en-US" dirty="0"/>
+              <a:t>Syria. </a:t>
+            </a:r>
+            <a:r>
+              <a:rPr lang="en-US" dirty="0" smtClean="0"/>
+              <a:t>IAF </a:t>
+            </a:r>
+            <a:r>
+              <a:rPr lang="en-US" dirty="0"/>
+              <a:t>primarily targets advanced weapon systems (Ballistic missiles, offensive drones</a:t>
+            </a:r>
+            <a:r>
+              <a:rPr lang="en-US" dirty="0" smtClean="0"/>
+              <a:t>), </a:t>
+            </a:r>
+            <a:r>
+              <a:rPr lang="en-US" dirty="0"/>
+              <a:t>logistic facilities supporting the transfer of Iranian forces (camps, supplies) as well as </a:t>
+            </a:r>
+            <a:r>
+              <a:rPr lang="en-US" dirty="0" smtClean="0"/>
+              <a:t>personnel </a:t>
+            </a:r>
+            <a:r>
+              <a:rPr lang="en-US" dirty="0"/>
+              <a:t>(militants, high ranking officers</a:t>
+            </a:r>
+            <a:r>
+              <a:rPr lang="en-US" dirty="0" smtClean="0"/>
+              <a:t>).</a:t>
+            </a:r>
+          </a:p>
+          <a:p>
+            <a:r>
+              <a:rPr lang="en-US" dirty="0" smtClean="0"/>
+              <a:t>Along </a:t>
+            </a:r>
+            <a:r>
+              <a:rPr lang="en-US" dirty="0"/>
+              <a:t>the </a:t>
+            </a:r>
+            <a:r>
+              <a:rPr lang="en-US" dirty="0" smtClean="0"/>
+              <a:t>Lebanese </a:t>
+            </a:r>
+            <a:r>
+              <a:rPr lang="en-US" dirty="0"/>
+              <a:t>border, the IDF is engaged in constantly high level of tension facing </a:t>
+            </a:r>
+            <a:r>
+              <a:rPr lang="en-US" dirty="0" smtClean="0"/>
+              <a:t>Hezbollah </a:t>
+            </a:r>
+            <a:r>
+              <a:rPr lang="en-US" dirty="0"/>
+              <a:t>in Southern-Lebanon</a:t>
+            </a:r>
+            <a:endParaRPr lang="en-US" sz="1800" dirty="0"/>
+          </a:p>
+        </p:txBody>
+      </p:sp>
+      <p:sp>
+        <p:nvSpPr>
+          <p:cNvPr id="3" name="Tittel 2"/>
+          <p:cNvSpPr>
+            <a:spLocks noGrp="1"/>
+          </p:cNvSpPr>
+          <p:nvPr>
+            <p:ph type="title"/>
+          </p:nvPr>
+        </p:nvSpPr>
+        <p:spPr/>
+        <p:txBody>
+          <a:bodyPr/>
+          <a:lstStyle/>
+          <a:p>
+            <a:r>
+              <a:rPr lang="en-US" dirty="0" smtClean="0"/>
+              <a:t>SITUATION - Israel</a:t>
             </a:r>
             <a:endParaRPr lang="en-US" dirty="0"/>
           </a:p>
         </p:txBody>
       </p:sp>
-      <p:sp>
-        <p:nvSpPr>
-          <p:cNvPr id="3" name="Tittel 2"/>
-          <p:cNvSpPr>
-            <a:spLocks noGrp="1"/>
-          </p:cNvSpPr>
-          <p:nvPr>
-            <p:ph type="title"/>
-          </p:nvPr>
-        </p:nvSpPr>
-        <p:spPr/>
-        <p:txBody>
-          <a:bodyPr/>
-          <a:lstStyle/>
-          <a:p>
-            <a:r>
-              <a:rPr lang="en-US" dirty="0" smtClean="0"/>
-              <a:t>AOC</a:t>
-            </a:r>
-            <a:endParaRPr lang="en-US" dirty="0"/>
-          </a:p>
-        </p:txBody>
-      </p:sp>
     </p:spTree>
+    <p:extLst>
+      <p:ext uri="{BB962C8B-B14F-4D97-AF65-F5344CB8AC3E}">
+        <p14:creationId xmlns:p14="http://schemas.microsoft.com/office/powerpoint/2010/main" val="1071050635"/>
+      </p:ext>
+    </p:extLst>
   </p:cSld>
   <p:clrMapOvr>
     <a:masterClrMapping/>
@@ -4862,37 +5880,106 @@
             <p:ph idx="1"/>
           </p:nvPr>
         </p:nvSpPr>
-        <p:spPr>
-          <a:xfrm>
-            <a:off x="0" y="843558"/>
-            <a:ext cx="4572000" cy="4176463"/>
-          </a:xfrm>
-        </p:spPr>
-        <p:txBody>
-          <a:bodyPr/>
-          <a:lstStyle/>
-          <a:p>
-            <a:r>
-              <a:rPr lang="en-US" dirty="0" smtClean="0"/>
-              <a:t>Higher intelligence agency.</a:t>
-            </a:r>
-          </a:p>
-          <a:p>
-            <a:r>
-              <a:rPr lang="en-US" dirty="0" smtClean="0"/>
-              <a:t>Mission designers /event host</a:t>
-            </a:r>
-          </a:p>
-          <a:p>
-            <a:r>
-              <a:rPr lang="en-US" dirty="0" smtClean="0"/>
-              <a:t>A way for mission designers/event hosts to introduce intelligence into the scenario.</a:t>
-            </a:r>
-          </a:p>
-          <a:p>
-            <a:r>
-              <a:rPr lang="en-US" dirty="0" smtClean="0"/>
-              <a:t>Reports will be forwarded to VIS</a:t>
+        <p:spPr/>
+        <p:txBody>
+          <a:bodyPr/>
+          <a:lstStyle/>
+          <a:p>
+            <a:pPr marL="0" indent="0">
+              <a:buNone/>
+            </a:pPr>
+            <a:r>
+              <a:rPr lang="en-US" b="1" dirty="0" smtClean="0"/>
+              <a:t>Turkey</a:t>
+            </a:r>
+          </a:p>
+          <a:p>
+            <a:r>
+              <a:rPr lang="en-US" dirty="0" smtClean="0"/>
+              <a:t>Slowly </a:t>
+            </a:r>
+            <a:r>
+              <a:rPr lang="en-US" dirty="0"/>
+              <a:t>recovering from </a:t>
+            </a:r>
+            <a:r>
+              <a:rPr lang="en-US" dirty="0" smtClean="0"/>
+              <a:t>a financial </a:t>
+            </a:r>
+            <a:r>
+              <a:rPr lang="en-US" dirty="0"/>
+              <a:t>crisis affecting military combat readiness </a:t>
+            </a:r>
+            <a:r>
+              <a:rPr lang="en-US" dirty="0" smtClean="0"/>
+              <a:t>which manifests as:</a:t>
+            </a:r>
+          </a:p>
+          <a:p>
+            <a:pPr lvl="1"/>
+            <a:r>
+              <a:rPr lang="en-US" dirty="0" smtClean="0"/>
+              <a:t>Difficulties </a:t>
+            </a:r>
+            <a:r>
+              <a:rPr lang="en-US" dirty="0"/>
+              <a:t>maintaining qualified </a:t>
+            </a:r>
+            <a:r>
+              <a:rPr lang="en-US" dirty="0" smtClean="0"/>
+              <a:t>personnel</a:t>
+            </a:r>
+          </a:p>
+          <a:p>
+            <a:pPr lvl="1"/>
+            <a:r>
+              <a:rPr lang="en-US" dirty="0" smtClean="0"/>
+              <a:t>Deterioration </a:t>
+            </a:r>
+            <a:r>
+              <a:rPr lang="en-US" dirty="0"/>
+              <a:t>of equipment due to maintenance </a:t>
+            </a:r>
+            <a:r>
+              <a:rPr lang="en-US" dirty="0" smtClean="0"/>
+              <a:t>difficulties</a:t>
+            </a:r>
+          </a:p>
+          <a:p>
+            <a:pPr lvl="1"/>
+            <a:r>
+              <a:rPr lang="en-US" dirty="0" smtClean="0"/>
+              <a:t>Limited </a:t>
+            </a:r>
+            <a:r>
+              <a:rPr lang="en-US" dirty="0"/>
+              <a:t>national reserves of </a:t>
+            </a:r>
+            <a:r>
+              <a:rPr lang="en-US" dirty="0" smtClean="0"/>
+              <a:t>consumables needed for combat activity</a:t>
+            </a:r>
+          </a:p>
+          <a:p>
+            <a:r>
+              <a:rPr lang="en-US" dirty="0" smtClean="0"/>
+              <a:t>After </a:t>
+            </a:r>
+            <a:r>
+              <a:rPr lang="en-US" dirty="0"/>
+              <a:t>recognizing the rising threat from </a:t>
+            </a:r>
+            <a:r>
+              <a:rPr lang="en-US" dirty="0" smtClean="0"/>
+              <a:t>Syria, Turkey </a:t>
+            </a:r>
+            <a:r>
+              <a:rPr lang="en-US" dirty="0"/>
+              <a:t>requested UN support which lead to the formation and dispatching of CJTF-82 to the Middle </a:t>
+            </a:r>
+            <a:r>
+              <a:rPr lang="en-US" dirty="0" smtClean="0"/>
+              <a:t>East. However this was too late and the Syrian invasion has already begun by the time CJTF-82 was establishing in region.</a:t>
             </a:r>
             <a:endParaRPr lang="en-US" dirty="0"/>
           </a:p>
@@ -4915,39 +6002,18 @@
           <a:p>
             <a:r>
               <a:rPr lang="en-US" dirty="0" smtClean="0"/>
-              <a:t>VID</a:t>
+              <a:t>SITUATION - Turkey</a:t>
             </a:r>
             <a:endParaRPr lang="en-US" dirty="0"/>
           </a:p>
         </p:txBody>
       </p:sp>
-      <p:pic>
-        <p:nvPicPr>
-          <p:cNvPr id="5122" name="Picture 2" descr="https://media.discordapp.net/attachments/361618361815138313/738329332224753674/unknown.png?width=665&amp;height=677"/>
-          <p:cNvPicPr>
-            <a:picLocks noChangeAspect="1" noChangeArrowheads="1"/>
-          </p:cNvPicPr>
-          <p:nvPr/>
-        </p:nvPicPr>
-        <p:blipFill>
-          <a:blip r:embed="rId2" cstate="print"/>
-          <a:srcRect/>
-          <a:stretch>
-            <a:fillRect/>
-          </a:stretch>
-        </p:blipFill>
-        <p:spPr bwMode="auto">
-          <a:xfrm>
-            <a:off x="5364088" y="1131590"/>
-            <a:ext cx="3112192" cy="3168352"/>
-          </a:xfrm>
-          <a:prstGeom prst="rect">
-            <a:avLst/>
-          </a:prstGeom>
-          <a:noFill/>
-        </p:spPr>
-      </p:pic>
     </p:spTree>
+    <p:extLst>
+      <p:ext uri="{BB962C8B-B14F-4D97-AF65-F5344CB8AC3E}">
+        <p14:creationId xmlns:p14="http://schemas.microsoft.com/office/powerpoint/2010/main" val="3732348751"/>
+      </p:ext>
+    </p:extLst>
   </p:cSld>
   <p:clrMapOvr>
     <a:masterClrMapping/>
@@ -4982,59 +6048,74 @@
             <p:ph idx="1"/>
           </p:nvPr>
         </p:nvSpPr>
-        <p:spPr>
-          <a:xfrm>
-            <a:off x="0" y="843558"/>
-            <a:ext cx="4572000" cy="4176463"/>
-          </a:xfrm>
-        </p:spPr>
-        <p:txBody>
-          <a:bodyPr/>
-          <a:lstStyle/>
-          <a:p>
-            <a:r>
-              <a:rPr lang="en-US" dirty="0" smtClean="0"/>
-              <a:t>Intelligence agency that supports operations</a:t>
-            </a:r>
-          </a:p>
-          <a:p>
-            <a:r>
-              <a:rPr lang="en-US" dirty="0" smtClean="0"/>
-              <a:t>Volunteer 132</a:t>
-            </a:r>
-            <a:r>
-              <a:rPr lang="en-US" baseline="30000" dirty="0" smtClean="0"/>
-              <a:t>nd</a:t>
-            </a:r>
-            <a:r>
-              <a:rPr lang="en-US" dirty="0" smtClean="0"/>
-              <a:t> members</a:t>
-            </a:r>
-          </a:p>
-          <a:p>
-            <a:r>
-              <a:rPr lang="en-US" dirty="0" smtClean="0"/>
-              <a:t>Most of the operation will intelligence driven, and that intelligence will come from events.</a:t>
-            </a:r>
-          </a:p>
-          <a:p>
-            <a:endParaRPr lang="en-US" dirty="0" smtClean="0"/>
-          </a:p>
-          <a:p>
-            <a:pPr>
+        <p:spPr/>
+        <p:txBody>
+          <a:bodyPr/>
+          <a:lstStyle/>
+          <a:p>
+            <a:pPr marL="0" indent="0">
               <a:buNone/>
             </a:pPr>
             <a:r>
-              <a:rPr lang="en-US" dirty="0" smtClean="0"/>
-              <a:t>For details:</a:t>
-            </a:r>
-            <a:endParaRPr lang="en-US" dirty="0" smtClean="0"/>
-          </a:p>
-          <a:p>
-            <a:r>
-              <a:rPr lang="en-US" dirty="0" smtClean="0"/>
-              <a:t>See VIS Instructions (LINK)</a:t>
-            </a:r>
+              <a:rPr lang="en-US" b="1" dirty="0" smtClean="0"/>
+              <a:t>Russia</a:t>
+            </a:r>
+          </a:p>
+          <a:p>
+            <a:pPr marL="0" indent="0">
+              <a:buNone/>
+            </a:pPr>
+            <a:r>
+              <a:rPr lang="en-US" dirty="0" smtClean="0"/>
+              <a:t>Russia has its </a:t>
+            </a:r>
+            <a:r>
+              <a:rPr lang="en-US" dirty="0"/>
+              <a:t>strategic interests in </a:t>
+            </a:r>
+            <a:r>
+              <a:rPr lang="en-US" dirty="0" smtClean="0"/>
+              <a:t>Syria:</a:t>
+            </a:r>
+          </a:p>
+          <a:p>
+            <a:pPr marL="457200" indent="-457200">
+              <a:buAutoNum type="arabicParenR"/>
+            </a:pPr>
+            <a:r>
+              <a:rPr lang="en-US" dirty="0" smtClean="0"/>
+              <a:t>The </a:t>
+            </a:r>
+            <a:r>
+              <a:rPr lang="en-US" dirty="0"/>
+              <a:t>TARTUS naval base (Russian's only major port in the Eastern Mediterranean) </a:t>
+            </a:r>
+            <a:r>
+              <a:rPr lang="en-US" dirty="0" smtClean="0"/>
+              <a:t>operated by Russian personnel (advisors and fleet shipyard) and defended by SAM units manned by Russian servicemen.</a:t>
+            </a:r>
+          </a:p>
+          <a:p>
+            <a:pPr marL="457200" indent="-457200">
+              <a:buAutoNum type="arabicParenR"/>
+            </a:pPr>
+            <a:r>
+              <a:rPr lang="en-US" dirty="0" smtClean="0"/>
+              <a:t>The </a:t>
+            </a:r>
+            <a:r>
+              <a:rPr lang="en-US" dirty="0"/>
+              <a:t>presence of military advisors and </a:t>
+            </a:r>
+            <a:r>
+              <a:rPr lang="en-US" dirty="0" smtClean="0"/>
+              <a:t>aerial </a:t>
+            </a:r>
+            <a:r>
+              <a:rPr lang="en-US" dirty="0"/>
+              <a:t>assets used for infliction of power and influence in the Middle East</a:t>
+            </a:r>
+            <a:endParaRPr lang="en-US" dirty="0"/>
           </a:p>
         </p:txBody>
       </p:sp>
@@ -5055,37 +6136,18 @@
           <a:p>
             <a:r>
               <a:rPr lang="en-US" dirty="0" smtClean="0"/>
-              <a:t>VIS</a:t>
+              <a:t>SITUATION - Russia</a:t>
             </a:r>
             <a:endParaRPr lang="en-US" dirty="0"/>
           </a:p>
         </p:txBody>
       </p:sp>
-      <p:pic>
-        <p:nvPicPr>
-          <p:cNvPr id="4" name="Bilde 3" descr="C:\Users\Sjefen\Desktop\OPUF VIS logo\Virtual_Intelligence_Service_only_logo.PNG"/>
-          <p:cNvPicPr/>
-          <p:nvPr/>
-        </p:nvPicPr>
-        <p:blipFill>
-          <a:blip r:embed="rId2" cstate="print"/>
-          <a:srcRect/>
-          <a:stretch>
-            <a:fillRect/>
-          </a:stretch>
-        </p:blipFill>
-        <p:spPr bwMode="auto">
-          <a:xfrm>
-            <a:off x="5724128" y="1419622"/>
-            <a:ext cx="2696716" cy="2304256"/>
-          </a:xfrm>
-          <a:prstGeom prst="rect">
-            <a:avLst/>
-          </a:prstGeom>
-          <a:noFill/>
-        </p:spPr>
-      </p:pic>
     </p:spTree>
+    <p:extLst>
+      <p:ext uri="{BB962C8B-B14F-4D97-AF65-F5344CB8AC3E}">
+        <p14:creationId xmlns:p14="http://schemas.microsoft.com/office/powerpoint/2010/main" val="3527586290"/>
+      </p:ext>
+    </p:extLst>
   </p:cSld>
   <p:clrMapOvr>
     <a:masterClrMapping/>

</xml_diff>